<commit_message>
Added some more details to duplicator
</commit_message>
<xml_diff>
--- a/paper/figs/images.pptx
+++ b/paper/figs/images.pptx
@@ -6,6 +6,7 @@
   </p:sldMasterIdLst>
   <p:sldIdLst>
     <p:sldId id="256" r:id="rId2"/>
+    <p:sldId id="257" r:id="rId3"/>
   </p:sldIdLst>
   <p:sldSz cx="9144000" cy="6858000" type="screen4x3"/>
   <p:notesSz cx="6858000" cy="9144000"/>
@@ -288,7 +289,7 @@
           <a:p>
             <a:fld id="{06D27FD6-7394-0F44-B86B-46BBC2D874F2}" type="datetimeFigureOut">
               <a:rPr lang="en-US" smtClean="0"/>
-              <a:t>4/4/14</a:t>
+              <a:t>4/29/14</a:t>
             </a:fld>
             <a:endParaRPr lang="en-US"/>
           </a:p>
@@ -458,7 +459,7 @@
           <a:p>
             <a:fld id="{06D27FD6-7394-0F44-B86B-46BBC2D874F2}" type="datetimeFigureOut">
               <a:rPr lang="en-US" smtClean="0"/>
-              <a:t>4/4/14</a:t>
+              <a:t>4/29/14</a:t>
             </a:fld>
             <a:endParaRPr lang="en-US"/>
           </a:p>
@@ -638,7 +639,7 @@
           <a:p>
             <a:fld id="{06D27FD6-7394-0F44-B86B-46BBC2D874F2}" type="datetimeFigureOut">
               <a:rPr lang="en-US" smtClean="0"/>
-              <a:t>4/4/14</a:t>
+              <a:t>4/29/14</a:t>
             </a:fld>
             <a:endParaRPr lang="en-US"/>
           </a:p>
@@ -808,7 +809,7 @@
           <a:p>
             <a:fld id="{06D27FD6-7394-0F44-B86B-46BBC2D874F2}" type="datetimeFigureOut">
               <a:rPr lang="en-US" smtClean="0"/>
-              <a:t>4/4/14</a:t>
+              <a:t>4/29/14</a:t>
             </a:fld>
             <a:endParaRPr lang="en-US"/>
           </a:p>
@@ -1054,7 +1055,7 @@
           <a:p>
             <a:fld id="{06D27FD6-7394-0F44-B86B-46BBC2D874F2}" type="datetimeFigureOut">
               <a:rPr lang="en-US" smtClean="0"/>
-              <a:t>4/4/14</a:t>
+              <a:t>4/29/14</a:t>
             </a:fld>
             <a:endParaRPr lang="en-US"/>
           </a:p>
@@ -1342,7 +1343,7 @@
           <a:p>
             <a:fld id="{06D27FD6-7394-0F44-B86B-46BBC2D874F2}" type="datetimeFigureOut">
               <a:rPr lang="en-US" smtClean="0"/>
-              <a:t>4/4/14</a:t>
+              <a:t>4/29/14</a:t>
             </a:fld>
             <a:endParaRPr lang="en-US"/>
           </a:p>
@@ -1764,7 +1765,7 @@
           <a:p>
             <a:fld id="{06D27FD6-7394-0F44-B86B-46BBC2D874F2}" type="datetimeFigureOut">
               <a:rPr lang="en-US" smtClean="0"/>
-              <a:t>4/4/14</a:t>
+              <a:t>4/29/14</a:t>
             </a:fld>
             <a:endParaRPr lang="en-US"/>
           </a:p>
@@ -1882,7 +1883,7 @@
           <a:p>
             <a:fld id="{06D27FD6-7394-0F44-B86B-46BBC2D874F2}" type="datetimeFigureOut">
               <a:rPr lang="en-US" smtClean="0"/>
-              <a:t>4/4/14</a:t>
+              <a:t>4/29/14</a:t>
             </a:fld>
             <a:endParaRPr lang="en-US"/>
           </a:p>
@@ -1977,7 +1978,7 @@
           <a:p>
             <a:fld id="{06D27FD6-7394-0F44-B86B-46BBC2D874F2}" type="datetimeFigureOut">
               <a:rPr lang="en-US" smtClean="0"/>
-              <a:t>4/4/14</a:t>
+              <a:t>4/29/14</a:t>
             </a:fld>
             <a:endParaRPr lang="en-US"/>
           </a:p>
@@ -2254,7 +2255,7 @@
           <a:p>
             <a:fld id="{06D27FD6-7394-0F44-B86B-46BBC2D874F2}" type="datetimeFigureOut">
               <a:rPr lang="en-US" smtClean="0"/>
-              <a:t>4/4/14</a:t>
+              <a:t>4/29/14</a:t>
             </a:fld>
             <a:endParaRPr lang="en-US"/>
           </a:p>
@@ -2507,7 +2508,7 @@
           <a:p>
             <a:fld id="{06D27FD6-7394-0F44-B86B-46BBC2D874F2}" type="datetimeFigureOut">
               <a:rPr lang="en-US" smtClean="0"/>
-              <a:t>4/4/14</a:t>
+              <a:t>4/29/14</a:t>
             </a:fld>
             <a:endParaRPr lang="en-US"/>
           </a:p>
@@ -2720,7 +2721,7 @@
           <a:p>
             <a:fld id="{06D27FD6-7394-0F44-B86B-46BBC2D874F2}" type="datetimeFigureOut">
               <a:rPr lang="en-US" smtClean="0"/>
-              <a:t>4/4/14</a:t>
+              <a:t>4/29/14</a:t>
             </a:fld>
             <a:endParaRPr lang="en-US"/>
           </a:p>
@@ -3095,6 +3096,94 @@
           <a:chExt cx="0" cy="0"/>
         </a:xfrm>
       </p:grpSpPr>
+      <p:sp>
+        <p:nvSpPr>
+          <p:cNvPr id="3" name="Rectangle 2"/>
+          <p:cNvSpPr/>
+          <p:nvPr/>
+        </p:nvSpPr>
+        <p:spPr>
+          <a:xfrm>
+            <a:off x="2442380" y="3520803"/>
+            <a:ext cx="3006842" cy="1559599"/>
+          </a:xfrm>
+          <a:prstGeom prst="rect">
+            <a:avLst/>
+          </a:prstGeom>
+          <a:solidFill>
+            <a:schemeClr val="accent2">
+              <a:lumMod val="40000"/>
+              <a:lumOff val="60000"/>
+            </a:schemeClr>
+          </a:solidFill>
+          <a:ln w="22225">
+            <a:solidFill>
+              <a:schemeClr val="tx1"/>
+            </a:solidFill>
+            <a:prstDash val="dashDot"/>
+          </a:ln>
+        </p:spPr>
+        <p:style>
+          <a:lnRef idx="1">
+            <a:schemeClr val="accent1"/>
+          </a:lnRef>
+          <a:fillRef idx="3">
+            <a:schemeClr val="accent1"/>
+          </a:fillRef>
+          <a:effectRef idx="2">
+            <a:schemeClr val="accent1"/>
+          </a:effectRef>
+          <a:fontRef idx="minor">
+            <a:schemeClr val="lt1"/>
+          </a:fontRef>
+        </p:style>
+        <p:txBody>
+          <a:bodyPr rtlCol="0" anchor="ctr"/>
+          <a:lstStyle/>
+          <a:p>
+            <a:pPr algn="ctr"/>
+            <a:endParaRPr lang="en-US"/>
+          </a:p>
+        </p:txBody>
+      </p:sp>
+      <p:sp>
+        <p:nvSpPr>
+          <p:cNvPr id="2" name="Rectangle 1"/>
+          <p:cNvSpPr/>
+          <p:nvPr/>
+        </p:nvSpPr>
+        <p:spPr>
+          <a:xfrm rot="16200000">
+            <a:off x="5587022" y="3064742"/>
+            <a:ext cx="1153193" cy="784109"/>
+          </a:xfrm>
+          <a:prstGeom prst="rect">
+            <a:avLst/>
+          </a:prstGeom>
+        </p:spPr>
+        <p:style>
+          <a:lnRef idx="1">
+            <a:schemeClr val="accent1"/>
+          </a:lnRef>
+          <a:fillRef idx="3">
+            <a:schemeClr val="accent1"/>
+          </a:fillRef>
+          <a:effectRef idx="2">
+            <a:schemeClr val="accent1"/>
+          </a:effectRef>
+          <a:fontRef idx="minor">
+            <a:schemeClr val="lt1"/>
+          </a:fontRef>
+        </p:style>
+        <p:txBody>
+          <a:bodyPr rtlCol="0" anchor="ctr"/>
+          <a:lstStyle/>
+          <a:p>
+            <a:pPr algn="ctr"/>
+            <a:endParaRPr lang="en-US"/>
+          </a:p>
+        </p:txBody>
+      </p:sp>
       <p:grpSp>
         <p:nvGrpSpPr>
           <p:cNvPr id="76" name="Group 75"/>
@@ -3440,9 +3529,9 @@
         <p:grpSpPr>
           <a:xfrm>
             <a:off x="516269" y="2249461"/>
-            <a:ext cx="5716960" cy="2540201"/>
+            <a:ext cx="5858075" cy="2540201"/>
             <a:chOff x="516269" y="2249461"/>
-            <a:chExt cx="5716960" cy="2540201"/>
+            <a:chExt cx="5858075" cy="2540201"/>
           </a:xfrm>
         </p:grpSpPr>
         <p:sp>
@@ -3653,7 +3742,7 @@
           </p:nvCxnSpPr>
           <p:spPr>
             <a:xfrm>
-              <a:off x="2322974" y="3520803"/>
+              <a:off x="2322974" y="3444811"/>
               <a:ext cx="488476" cy="0"/>
             </a:xfrm>
             <a:prstGeom prst="straightConnector1">
@@ -3737,7 +3826,7 @@
           <p:spPr>
             <a:xfrm>
               <a:off x="2811450" y="3219874"/>
-              <a:ext cx="868401" cy="646331"/>
+              <a:ext cx="868401" cy="461665"/>
             </a:xfrm>
             <a:prstGeom prst="rect">
               <a:avLst/>
@@ -3753,14 +3842,14 @@
               <a:pPr algn="ctr"/>
               <a:r>
                 <a:rPr lang="en-US" sz="1200" dirty="0" smtClean="0"/>
-                <a:t>Proxy(load-balancer)</a:t>
+                <a:t>Proxy</a:t>
               </a:r>
             </a:p>
             <a:p>
               <a:pPr algn="ctr"/>
               <a:r>
                 <a:rPr lang="en-US" sz="1200" dirty="0" smtClean="0"/>
-                <a:t>Process</a:t>
+                <a:t>Duplicator</a:t>
               </a:r>
               <a:endParaRPr lang="en-US" sz="1200" dirty="0"/>
             </a:p>
@@ -4229,7 +4318,7 @@
           </p:nvSpPr>
           <p:spPr>
             <a:xfrm rot="5400000">
-              <a:off x="5568196" y="3233091"/>
+              <a:off x="5709311" y="3233091"/>
               <a:ext cx="868401" cy="461665"/>
             </a:xfrm>
             <a:prstGeom prst="rect">
@@ -4246,14 +4335,7 @@
               <a:pPr algn="ctr"/>
               <a:r>
                 <a:rPr lang="en-US" sz="1200" i="1" dirty="0" smtClean="0"/>
-                <a:t>Online</a:t>
-              </a:r>
-            </a:p>
-            <a:p>
-              <a:pPr algn="ctr"/>
-              <a:r>
-                <a:rPr lang="en-US" sz="1200" i="1" dirty="0" smtClean="0"/>
-                <a:t>Migrate</a:t>
+                <a:t>Clone Manager</a:t>
               </a:r>
               <a:endParaRPr lang="en-US" sz="1200" i="1" dirty="0"/>
             </a:p>
@@ -4334,6 +4416,1632 @@
     <p:extLst>
       <p:ext uri="{BB962C8B-B14F-4D97-AF65-F5344CB8AC3E}">
         <p14:creationId xmlns:p14="http://schemas.microsoft.com/office/powerpoint/2010/main" val="1442316366"/>
+      </p:ext>
+    </p:extLst>
+  </p:cSld>
+  <p:clrMapOvr>
+    <a:masterClrMapping/>
+  </p:clrMapOvr>
+</p:sld>
+</file>
+
+<file path=ppt/slides/slide2.xml><?xml version="1.0" encoding="utf-8"?>
+<p:sld xmlns:a="http://schemas.openxmlformats.org/drawingml/2006/main" xmlns:r="http://schemas.openxmlformats.org/officeDocument/2006/relationships" xmlns:p="http://schemas.openxmlformats.org/presentationml/2006/main">
+  <p:cSld>
+    <p:spTree>
+      <p:nvGrpSpPr>
+        <p:cNvPr id="1" name=""/>
+        <p:cNvGrpSpPr/>
+        <p:nvPr/>
+      </p:nvGrpSpPr>
+      <p:grpSpPr>
+        <a:xfrm>
+          <a:off x="0" y="0"/>
+          <a:ext cx="0" cy="0"/>
+          <a:chOff x="0" y="0"/>
+          <a:chExt cx="0" cy="0"/>
+        </a:xfrm>
+      </p:grpSpPr>
+      <p:sp>
+        <p:nvSpPr>
+          <p:cNvPr id="33" name="Rectangle 32"/>
+          <p:cNvSpPr/>
+          <p:nvPr/>
+        </p:nvSpPr>
+        <p:spPr>
+          <a:xfrm>
+            <a:off x="2279554" y="1276912"/>
+            <a:ext cx="4157475" cy="3997417"/>
+          </a:xfrm>
+          <a:prstGeom prst="rect">
+            <a:avLst/>
+          </a:prstGeom>
+          <a:noFill/>
+          <a:ln w="25400">
+            <a:solidFill>
+              <a:schemeClr val="tx1"/>
+            </a:solidFill>
+          </a:ln>
+          <a:effectLst/>
+        </p:spPr>
+        <p:style>
+          <a:lnRef idx="1">
+            <a:schemeClr val="accent1"/>
+          </a:lnRef>
+          <a:fillRef idx="3">
+            <a:schemeClr val="accent1"/>
+          </a:fillRef>
+          <a:effectRef idx="2">
+            <a:schemeClr val="accent1"/>
+          </a:effectRef>
+          <a:fontRef idx="minor">
+            <a:schemeClr val="lt1"/>
+          </a:fontRef>
+        </p:style>
+        <p:txBody>
+          <a:bodyPr rtlCol="0" anchor="ctr"/>
+          <a:lstStyle/>
+          <a:p>
+            <a:pPr algn="ctr"/>
+            <a:endParaRPr lang="en-US"/>
+          </a:p>
+        </p:txBody>
+      </p:sp>
+      <p:sp>
+        <p:nvSpPr>
+          <p:cNvPr id="34" name="Rectangle 33"/>
+          <p:cNvSpPr/>
+          <p:nvPr/>
+        </p:nvSpPr>
+        <p:spPr>
+          <a:xfrm>
+            <a:off x="2452806" y="1681140"/>
+            <a:ext cx="2019463" cy="641748"/>
+          </a:xfrm>
+          <a:prstGeom prst="rect">
+            <a:avLst/>
+          </a:prstGeom>
+          <a:noFill/>
+          <a:ln w="25400">
+            <a:solidFill>
+              <a:schemeClr val="tx1"/>
+            </a:solidFill>
+          </a:ln>
+          <a:effectLst/>
+        </p:spPr>
+        <p:style>
+          <a:lnRef idx="1">
+            <a:schemeClr val="accent1"/>
+          </a:lnRef>
+          <a:fillRef idx="3">
+            <a:schemeClr val="accent1"/>
+          </a:fillRef>
+          <a:effectRef idx="2">
+            <a:schemeClr val="accent1"/>
+          </a:effectRef>
+          <a:fontRef idx="minor">
+            <a:schemeClr val="lt1"/>
+          </a:fontRef>
+        </p:style>
+        <p:txBody>
+          <a:bodyPr rtlCol="0" anchor="ctr"/>
+          <a:lstStyle/>
+          <a:p>
+            <a:pPr algn="ctr"/>
+            <a:endParaRPr lang="en-US"/>
+          </a:p>
+        </p:txBody>
+      </p:sp>
+      <p:sp>
+        <p:nvSpPr>
+          <p:cNvPr id="35" name="TextBox 34"/>
+          <p:cNvSpPr txBox="1"/>
+          <p:nvPr/>
+        </p:nvSpPr>
+        <p:spPr>
+          <a:xfrm>
+            <a:off x="2409388" y="1802217"/>
+            <a:ext cx="2182287" cy="338554"/>
+          </a:xfrm>
+          <a:prstGeom prst="rect">
+            <a:avLst/>
+          </a:prstGeom>
+          <a:noFill/>
+        </p:spPr>
+        <p:txBody>
+          <a:bodyPr wrap="square" rtlCol="0">
+            <a:spAutoFit/>
+          </a:bodyPr>
+          <a:lstStyle/>
+          <a:p>
+            <a:r>
+              <a:rPr lang="en-US" sz="1600" dirty="0"/>
+              <a:t>2</a:t>
+            </a:r>
+            <a:r>
+              <a:rPr lang="en-US" sz="1600" dirty="0" smtClean="0"/>
+              <a:t>: Connection Manager</a:t>
+            </a:r>
+            <a:endParaRPr lang="en-US" sz="1600" dirty="0"/>
+          </a:p>
+        </p:txBody>
+      </p:sp>
+      <p:sp>
+        <p:nvSpPr>
+          <p:cNvPr id="36" name="Rectangle 35"/>
+          <p:cNvSpPr/>
+          <p:nvPr/>
+        </p:nvSpPr>
+        <p:spPr>
+          <a:xfrm>
+            <a:off x="2181860" y="3906529"/>
+            <a:ext cx="270946" cy="350445"/>
+          </a:xfrm>
+          <a:prstGeom prst="rect">
+            <a:avLst/>
+          </a:prstGeom>
+          <a:solidFill>
+            <a:schemeClr val="tx1">
+              <a:lumMod val="50000"/>
+              <a:lumOff val="50000"/>
+            </a:schemeClr>
+          </a:solidFill>
+          <a:ln w="25400">
+            <a:solidFill>
+              <a:schemeClr val="tx1"/>
+            </a:solidFill>
+          </a:ln>
+          <a:effectLst/>
+        </p:spPr>
+        <p:style>
+          <a:lnRef idx="1">
+            <a:schemeClr val="accent1"/>
+          </a:lnRef>
+          <a:fillRef idx="3">
+            <a:schemeClr val="accent1"/>
+          </a:fillRef>
+          <a:effectRef idx="2">
+            <a:schemeClr val="accent1"/>
+          </a:effectRef>
+          <a:fontRef idx="minor">
+            <a:schemeClr val="lt1"/>
+          </a:fontRef>
+        </p:style>
+        <p:txBody>
+          <a:bodyPr rtlCol="0" anchor="ctr"/>
+          <a:lstStyle/>
+          <a:p>
+            <a:pPr algn="ctr"/>
+            <a:endParaRPr lang="en-US"/>
+          </a:p>
+        </p:txBody>
+      </p:sp>
+      <p:cxnSp>
+        <p:nvCxnSpPr>
+          <p:cNvPr id="40" name="Straight Arrow Connector 39"/>
+          <p:cNvCxnSpPr/>
+          <p:nvPr/>
+        </p:nvCxnSpPr>
+        <p:spPr>
+          <a:xfrm>
+            <a:off x="1736804" y="4038328"/>
+            <a:ext cx="445056" cy="0"/>
+          </a:xfrm>
+          <a:prstGeom prst="straightConnector1">
+            <a:avLst/>
+          </a:prstGeom>
+          <a:ln>
+            <a:solidFill>
+              <a:schemeClr val="tx1"/>
+            </a:solidFill>
+            <a:tailEnd type="arrow"/>
+          </a:ln>
+          <a:effectLst/>
+        </p:spPr>
+        <p:style>
+          <a:lnRef idx="2">
+            <a:schemeClr val="accent1"/>
+          </a:lnRef>
+          <a:fillRef idx="0">
+            <a:schemeClr val="accent1"/>
+          </a:fillRef>
+          <a:effectRef idx="1">
+            <a:schemeClr val="accent1"/>
+          </a:effectRef>
+          <a:fontRef idx="minor">
+            <a:schemeClr val="tx1"/>
+          </a:fontRef>
+        </p:style>
+      </p:cxnSp>
+      <p:cxnSp>
+        <p:nvCxnSpPr>
+          <p:cNvPr id="43" name="Straight Arrow Connector 42"/>
+          <p:cNvCxnSpPr/>
+          <p:nvPr/>
+        </p:nvCxnSpPr>
+        <p:spPr>
+          <a:xfrm rot="5400000" flipH="1" flipV="1">
+            <a:off x="1850184" y="2925516"/>
+            <a:ext cx="1656653" cy="451405"/>
+          </a:xfrm>
+          <a:prstGeom prst="bentConnector3">
+            <a:avLst>
+              <a:gd name="adj1" fmla="val 199"/>
+            </a:avLst>
+          </a:prstGeom>
+          <a:ln>
+            <a:solidFill>
+              <a:schemeClr val="tx1"/>
+            </a:solidFill>
+            <a:tailEnd type="arrow"/>
+          </a:ln>
+          <a:effectLst/>
+        </p:spPr>
+        <p:style>
+          <a:lnRef idx="2">
+            <a:schemeClr val="accent1"/>
+          </a:lnRef>
+          <a:fillRef idx="0">
+            <a:schemeClr val="accent1"/>
+          </a:fillRef>
+          <a:effectRef idx="1">
+            <a:schemeClr val="accent1"/>
+          </a:effectRef>
+          <a:fontRef idx="minor">
+            <a:schemeClr val="tx1"/>
+          </a:fontRef>
+        </p:style>
+      </p:cxnSp>
+      <p:sp>
+        <p:nvSpPr>
+          <p:cNvPr id="46" name="Rectangle 45"/>
+          <p:cNvSpPr/>
+          <p:nvPr/>
+        </p:nvSpPr>
+        <p:spPr>
+          <a:xfrm rot="16200000">
+            <a:off x="5216033" y="1776613"/>
+            <a:ext cx="1166795" cy="598743"/>
+          </a:xfrm>
+          <a:prstGeom prst="rect">
+            <a:avLst/>
+          </a:prstGeom>
+          <a:noFill/>
+          <a:ln w="25400">
+            <a:solidFill>
+              <a:schemeClr val="tx1"/>
+            </a:solidFill>
+          </a:ln>
+          <a:effectLst/>
+        </p:spPr>
+        <p:style>
+          <a:lnRef idx="1">
+            <a:schemeClr val="accent1"/>
+          </a:lnRef>
+          <a:fillRef idx="3">
+            <a:schemeClr val="accent1"/>
+          </a:fillRef>
+          <a:effectRef idx="2">
+            <a:schemeClr val="accent1"/>
+          </a:effectRef>
+          <a:fontRef idx="minor">
+            <a:schemeClr val="lt1"/>
+          </a:fontRef>
+        </p:style>
+        <p:txBody>
+          <a:bodyPr rtlCol="0" anchor="ctr"/>
+          <a:lstStyle/>
+          <a:p>
+            <a:pPr algn="ctr"/>
+            <a:r>
+              <a:rPr lang="en-US" dirty="0" smtClean="0">
+                <a:solidFill>
+                  <a:schemeClr val="tx1"/>
+                </a:solidFill>
+              </a:rPr>
+              <a:t>3: TCP Connector</a:t>
+            </a:r>
+            <a:endParaRPr lang="en-US" dirty="0">
+              <a:solidFill>
+                <a:schemeClr val="tx1"/>
+              </a:solidFill>
+            </a:endParaRPr>
+          </a:p>
+        </p:txBody>
+      </p:sp>
+      <p:cxnSp>
+        <p:nvCxnSpPr>
+          <p:cNvPr id="48" name="Straight Arrow Connector 47"/>
+          <p:cNvCxnSpPr/>
+          <p:nvPr/>
+        </p:nvCxnSpPr>
+        <p:spPr>
+          <a:xfrm>
+            <a:off x="6113149" y="1979107"/>
+            <a:ext cx="776350" cy="0"/>
+          </a:xfrm>
+          <a:prstGeom prst="straightConnector1">
+            <a:avLst/>
+          </a:prstGeom>
+          <a:ln>
+            <a:solidFill>
+              <a:schemeClr val="tx1"/>
+            </a:solidFill>
+            <a:tailEnd type="arrow"/>
+          </a:ln>
+          <a:effectLst/>
+        </p:spPr>
+        <p:style>
+          <a:lnRef idx="2">
+            <a:schemeClr val="accent1"/>
+          </a:lnRef>
+          <a:fillRef idx="0">
+            <a:schemeClr val="accent1"/>
+          </a:fillRef>
+          <a:effectRef idx="1">
+            <a:schemeClr val="accent1"/>
+          </a:effectRef>
+          <a:fontRef idx="minor">
+            <a:schemeClr val="tx1"/>
+          </a:fontRef>
+        </p:style>
+      </p:cxnSp>
+      <p:cxnSp>
+        <p:nvCxnSpPr>
+          <p:cNvPr id="50" name="Straight Arrow Connector 49"/>
+          <p:cNvCxnSpPr/>
+          <p:nvPr/>
+        </p:nvCxnSpPr>
+        <p:spPr>
+          <a:xfrm>
+            <a:off x="4472269" y="1910773"/>
+            <a:ext cx="1027790" cy="0"/>
+          </a:xfrm>
+          <a:prstGeom prst="straightConnector1">
+            <a:avLst/>
+          </a:prstGeom>
+          <a:ln>
+            <a:solidFill>
+              <a:schemeClr val="tx1"/>
+            </a:solidFill>
+            <a:tailEnd type="arrow"/>
+          </a:ln>
+          <a:effectLst/>
+        </p:spPr>
+        <p:style>
+          <a:lnRef idx="2">
+            <a:schemeClr val="accent1"/>
+          </a:lnRef>
+          <a:fillRef idx="0">
+            <a:schemeClr val="accent1"/>
+          </a:fillRef>
+          <a:effectRef idx="1">
+            <a:schemeClr val="accent1"/>
+          </a:effectRef>
+          <a:fontRef idx="minor">
+            <a:schemeClr val="tx1"/>
+          </a:fontRef>
+        </p:style>
+      </p:cxnSp>
+      <p:cxnSp>
+        <p:nvCxnSpPr>
+          <p:cNvPr id="53" name="Straight Arrow Connector 52"/>
+          <p:cNvCxnSpPr/>
+          <p:nvPr/>
+        </p:nvCxnSpPr>
+        <p:spPr>
+          <a:xfrm flipH="1">
+            <a:off x="6108152" y="2131507"/>
+            <a:ext cx="781347" cy="0"/>
+          </a:xfrm>
+          <a:prstGeom prst="straightConnector1">
+            <a:avLst/>
+          </a:prstGeom>
+          <a:ln>
+            <a:solidFill>
+              <a:schemeClr val="tx1"/>
+            </a:solidFill>
+            <a:tailEnd type="arrow"/>
+          </a:ln>
+          <a:effectLst/>
+        </p:spPr>
+        <p:style>
+          <a:lnRef idx="2">
+            <a:schemeClr val="accent1"/>
+          </a:lnRef>
+          <a:fillRef idx="0">
+            <a:schemeClr val="accent1"/>
+          </a:fillRef>
+          <a:effectRef idx="1">
+            <a:schemeClr val="accent1"/>
+          </a:effectRef>
+          <a:fontRef idx="minor">
+            <a:schemeClr val="tx1"/>
+          </a:fontRef>
+        </p:style>
+      </p:cxnSp>
+      <p:sp>
+        <p:nvSpPr>
+          <p:cNvPr id="37" name="Rectangle 36"/>
+          <p:cNvSpPr/>
+          <p:nvPr/>
+        </p:nvSpPr>
+        <p:spPr>
+          <a:xfrm>
+            <a:off x="6287259" y="1889066"/>
+            <a:ext cx="270946" cy="350445"/>
+          </a:xfrm>
+          <a:prstGeom prst="rect">
+            <a:avLst/>
+          </a:prstGeom>
+          <a:solidFill>
+            <a:schemeClr val="tx1">
+              <a:lumMod val="50000"/>
+              <a:lumOff val="50000"/>
+            </a:schemeClr>
+          </a:solidFill>
+          <a:ln w="25400">
+            <a:solidFill>
+              <a:schemeClr val="tx1"/>
+            </a:solidFill>
+          </a:ln>
+          <a:effectLst/>
+        </p:spPr>
+        <p:style>
+          <a:lnRef idx="1">
+            <a:schemeClr val="accent1"/>
+          </a:lnRef>
+          <a:fillRef idx="3">
+            <a:schemeClr val="accent1"/>
+          </a:fillRef>
+          <a:effectRef idx="2">
+            <a:schemeClr val="accent1"/>
+          </a:effectRef>
+          <a:fontRef idx="minor">
+            <a:schemeClr val="lt1"/>
+          </a:fontRef>
+        </p:style>
+        <p:txBody>
+          <a:bodyPr rtlCol="0" anchor="ctr"/>
+          <a:lstStyle/>
+          <a:p>
+            <a:pPr algn="ctr"/>
+            <a:endParaRPr lang="en-US"/>
+          </a:p>
+        </p:txBody>
+      </p:sp>
+      <p:cxnSp>
+        <p:nvCxnSpPr>
+          <p:cNvPr id="56" name="Straight Arrow Connector 55"/>
+          <p:cNvCxnSpPr>
+            <a:stCxn id="46" idx="0"/>
+          </p:cNvCxnSpPr>
+          <p:nvPr/>
+        </p:nvCxnSpPr>
+        <p:spPr>
+          <a:xfrm flipH="1" flipV="1">
+            <a:off x="4472269" y="2067150"/>
+            <a:ext cx="1027790" cy="8834"/>
+          </a:xfrm>
+          <a:prstGeom prst="straightConnector1">
+            <a:avLst/>
+          </a:prstGeom>
+          <a:ln>
+            <a:solidFill>
+              <a:schemeClr val="tx1"/>
+            </a:solidFill>
+            <a:tailEnd type="arrow"/>
+          </a:ln>
+          <a:effectLst/>
+        </p:spPr>
+        <p:style>
+          <a:lnRef idx="2">
+            <a:schemeClr val="accent1"/>
+          </a:lnRef>
+          <a:fillRef idx="0">
+            <a:schemeClr val="accent1"/>
+          </a:fillRef>
+          <a:effectRef idx="1">
+            <a:schemeClr val="accent1"/>
+          </a:effectRef>
+          <a:fontRef idx="minor">
+            <a:schemeClr val="tx1"/>
+          </a:fontRef>
+        </p:style>
+      </p:cxnSp>
+      <p:cxnSp>
+        <p:nvCxnSpPr>
+          <p:cNvPr id="60" name="Straight Arrow Connector 59"/>
+          <p:cNvCxnSpPr>
+            <a:endCxn id="36" idx="3"/>
+          </p:cNvCxnSpPr>
+          <p:nvPr/>
+        </p:nvCxnSpPr>
+        <p:spPr>
+          <a:xfrm rot="5400000">
+            <a:off x="1864422" y="2911272"/>
+            <a:ext cx="1758864" cy="582096"/>
+          </a:xfrm>
+          <a:prstGeom prst="bentConnector2">
+            <a:avLst/>
+          </a:prstGeom>
+          <a:ln>
+            <a:solidFill>
+              <a:schemeClr val="tx1"/>
+            </a:solidFill>
+            <a:tailEnd type="arrow"/>
+          </a:ln>
+          <a:effectLst/>
+        </p:spPr>
+        <p:style>
+          <a:lnRef idx="2">
+            <a:schemeClr val="accent1"/>
+          </a:lnRef>
+          <a:fillRef idx="0">
+            <a:schemeClr val="accent1"/>
+          </a:fillRef>
+          <a:effectRef idx="1">
+            <a:schemeClr val="accent1"/>
+          </a:effectRef>
+          <a:fontRef idx="minor">
+            <a:schemeClr val="tx1"/>
+          </a:fontRef>
+        </p:style>
+      </p:cxnSp>
+      <p:sp>
+        <p:nvSpPr>
+          <p:cNvPr id="66" name="Rectangle 65"/>
+          <p:cNvSpPr/>
+          <p:nvPr/>
+        </p:nvSpPr>
+        <p:spPr>
+          <a:xfrm rot="16200000">
+            <a:off x="5211036" y="3377138"/>
+            <a:ext cx="1166795" cy="598743"/>
+          </a:xfrm>
+          <a:prstGeom prst="rect">
+            <a:avLst/>
+          </a:prstGeom>
+          <a:noFill/>
+          <a:ln w="25400">
+            <a:solidFill>
+              <a:schemeClr val="tx1"/>
+            </a:solidFill>
+          </a:ln>
+          <a:effectLst/>
+        </p:spPr>
+        <p:style>
+          <a:lnRef idx="1">
+            <a:schemeClr val="accent1"/>
+          </a:lnRef>
+          <a:fillRef idx="3">
+            <a:schemeClr val="accent1"/>
+          </a:fillRef>
+          <a:effectRef idx="2">
+            <a:schemeClr val="accent1"/>
+          </a:effectRef>
+          <a:fontRef idx="minor">
+            <a:schemeClr val="lt1"/>
+          </a:fontRef>
+        </p:style>
+        <p:txBody>
+          <a:bodyPr rtlCol="0" anchor="ctr"/>
+          <a:lstStyle/>
+          <a:p>
+            <a:pPr algn="ctr"/>
+            <a:r>
+              <a:rPr lang="en-US" dirty="0" smtClean="0">
+                <a:solidFill>
+                  <a:schemeClr val="tx1"/>
+                </a:solidFill>
+              </a:rPr>
+              <a:t>6: TCP Connector</a:t>
+            </a:r>
+            <a:endParaRPr lang="en-US" dirty="0">
+              <a:solidFill>
+                <a:schemeClr val="tx1"/>
+              </a:solidFill>
+            </a:endParaRPr>
+          </a:p>
+        </p:txBody>
+      </p:sp>
+      <p:cxnSp>
+        <p:nvCxnSpPr>
+          <p:cNvPr id="67" name="Straight Arrow Connector 66"/>
+          <p:cNvCxnSpPr/>
+          <p:nvPr/>
+        </p:nvCxnSpPr>
+        <p:spPr>
+          <a:xfrm>
+            <a:off x="6081014" y="3612199"/>
+            <a:ext cx="776350" cy="0"/>
+          </a:xfrm>
+          <a:prstGeom prst="straightConnector1">
+            <a:avLst/>
+          </a:prstGeom>
+          <a:ln>
+            <a:solidFill>
+              <a:schemeClr val="tx1"/>
+            </a:solidFill>
+            <a:tailEnd type="arrow"/>
+          </a:ln>
+          <a:effectLst/>
+        </p:spPr>
+        <p:style>
+          <a:lnRef idx="2">
+            <a:schemeClr val="accent1"/>
+          </a:lnRef>
+          <a:fillRef idx="0">
+            <a:schemeClr val="accent1"/>
+          </a:fillRef>
+          <a:effectRef idx="1">
+            <a:schemeClr val="accent1"/>
+          </a:effectRef>
+          <a:fontRef idx="minor">
+            <a:schemeClr val="tx1"/>
+          </a:fontRef>
+        </p:style>
+      </p:cxnSp>
+      <p:cxnSp>
+        <p:nvCxnSpPr>
+          <p:cNvPr id="68" name="Straight Arrow Connector 67"/>
+          <p:cNvCxnSpPr/>
+          <p:nvPr/>
+        </p:nvCxnSpPr>
+        <p:spPr>
+          <a:xfrm flipH="1">
+            <a:off x="6076017" y="3732032"/>
+            <a:ext cx="781347" cy="0"/>
+          </a:xfrm>
+          <a:prstGeom prst="straightConnector1">
+            <a:avLst/>
+          </a:prstGeom>
+          <a:ln>
+            <a:solidFill>
+              <a:schemeClr val="tx1"/>
+            </a:solidFill>
+            <a:tailEnd type="arrow"/>
+          </a:ln>
+          <a:effectLst/>
+        </p:spPr>
+        <p:style>
+          <a:lnRef idx="2">
+            <a:schemeClr val="accent1"/>
+          </a:lnRef>
+          <a:fillRef idx="0">
+            <a:schemeClr val="accent1"/>
+          </a:fillRef>
+          <a:effectRef idx="1">
+            <a:schemeClr val="accent1"/>
+          </a:effectRef>
+          <a:fontRef idx="minor">
+            <a:schemeClr val="tx1"/>
+          </a:fontRef>
+        </p:style>
+      </p:cxnSp>
+      <p:sp>
+        <p:nvSpPr>
+          <p:cNvPr id="38" name="Rectangle 37"/>
+          <p:cNvSpPr/>
+          <p:nvPr/>
+        </p:nvSpPr>
+        <p:spPr>
+          <a:xfrm>
+            <a:off x="6282047" y="3500020"/>
+            <a:ext cx="270946" cy="350445"/>
+          </a:xfrm>
+          <a:prstGeom prst="rect">
+            <a:avLst/>
+          </a:prstGeom>
+          <a:solidFill>
+            <a:schemeClr val="tx1">
+              <a:lumMod val="50000"/>
+              <a:lumOff val="50000"/>
+            </a:schemeClr>
+          </a:solidFill>
+          <a:ln w="25400">
+            <a:solidFill>
+              <a:schemeClr val="tx1"/>
+            </a:solidFill>
+          </a:ln>
+          <a:effectLst/>
+        </p:spPr>
+        <p:style>
+          <a:lnRef idx="1">
+            <a:schemeClr val="accent1"/>
+          </a:lnRef>
+          <a:fillRef idx="3">
+            <a:schemeClr val="accent1"/>
+          </a:fillRef>
+          <a:effectRef idx="2">
+            <a:schemeClr val="accent1"/>
+          </a:effectRef>
+          <a:fontRef idx="minor">
+            <a:schemeClr val="lt1"/>
+          </a:fontRef>
+        </p:style>
+        <p:txBody>
+          <a:bodyPr rtlCol="0" anchor="ctr"/>
+          <a:lstStyle/>
+          <a:p>
+            <a:pPr algn="ctr"/>
+            <a:endParaRPr lang="en-US"/>
+          </a:p>
+        </p:txBody>
+      </p:sp>
+      <p:sp>
+        <p:nvSpPr>
+          <p:cNvPr id="69" name="Rectangle 68"/>
+          <p:cNvSpPr/>
+          <p:nvPr/>
+        </p:nvSpPr>
+        <p:spPr>
+          <a:xfrm>
+            <a:off x="3365057" y="2603859"/>
+            <a:ext cx="1791079" cy="2507637"/>
+          </a:xfrm>
+          <a:prstGeom prst="rect">
+            <a:avLst/>
+          </a:prstGeom>
+          <a:noFill/>
+          <a:ln w="25400">
+            <a:solidFill>
+              <a:schemeClr val="tx1"/>
+            </a:solidFill>
+          </a:ln>
+          <a:effectLst/>
+        </p:spPr>
+        <p:style>
+          <a:lnRef idx="1">
+            <a:schemeClr val="accent1"/>
+          </a:lnRef>
+          <a:fillRef idx="3">
+            <a:schemeClr val="accent1"/>
+          </a:fillRef>
+          <a:effectRef idx="2">
+            <a:schemeClr val="accent1"/>
+          </a:effectRef>
+          <a:fontRef idx="minor">
+            <a:schemeClr val="lt1"/>
+          </a:fontRef>
+        </p:style>
+        <p:txBody>
+          <a:bodyPr rtlCol="0" anchor="ctr"/>
+          <a:lstStyle/>
+          <a:p>
+            <a:pPr algn="ctr"/>
+            <a:endParaRPr lang="en-US"/>
+          </a:p>
+        </p:txBody>
+      </p:sp>
+      <p:sp>
+        <p:nvSpPr>
+          <p:cNvPr id="85" name="TextBox 84"/>
+          <p:cNvSpPr txBox="1"/>
+          <p:nvPr/>
+        </p:nvSpPr>
+        <p:spPr>
+          <a:xfrm>
+            <a:off x="3365057" y="4641838"/>
+            <a:ext cx="1773291" cy="338554"/>
+          </a:xfrm>
+          <a:prstGeom prst="rect">
+            <a:avLst/>
+          </a:prstGeom>
+          <a:noFill/>
+        </p:spPr>
+        <p:txBody>
+          <a:bodyPr wrap="square" rtlCol="0">
+            <a:spAutoFit/>
+          </a:bodyPr>
+          <a:lstStyle/>
+          <a:p>
+            <a:pPr algn="ctr"/>
+            <a:r>
+              <a:rPr lang="en-US" sz="1600" dirty="0" smtClean="0"/>
+              <a:t>5: Buffer Manager</a:t>
+            </a:r>
+            <a:endParaRPr lang="en-US" sz="1600" dirty="0"/>
+          </a:p>
+        </p:txBody>
+      </p:sp>
+      <p:cxnSp>
+        <p:nvCxnSpPr>
+          <p:cNvPr id="86" name="Straight Arrow Connector 85"/>
+          <p:cNvCxnSpPr/>
+          <p:nvPr/>
+        </p:nvCxnSpPr>
+        <p:spPr>
+          <a:xfrm flipH="1">
+            <a:off x="3512356" y="2322892"/>
+            <a:ext cx="15744" cy="2318946"/>
+          </a:xfrm>
+          <a:prstGeom prst="straightConnector1">
+            <a:avLst/>
+          </a:prstGeom>
+          <a:ln>
+            <a:solidFill>
+              <a:schemeClr val="tx1"/>
+            </a:solidFill>
+            <a:tailEnd type="arrow"/>
+          </a:ln>
+          <a:effectLst/>
+        </p:spPr>
+        <p:style>
+          <a:lnRef idx="2">
+            <a:schemeClr val="accent1"/>
+          </a:lnRef>
+          <a:fillRef idx="0">
+            <a:schemeClr val="accent1"/>
+          </a:fillRef>
+          <a:effectRef idx="1">
+            <a:schemeClr val="accent1"/>
+          </a:effectRef>
+          <a:fontRef idx="minor">
+            <a:schemeClr val="tx1"/>
+          </a:fontRef>
+        </p:style>
+      </p:cxnSp>
+      <p:cxnSp>
+        <p:nvCxnSpPr>
+          <p:cNvPr id="89" name="Straight Arrow Connector 88"/>
+          <p:cNvCxnSpPr/>
+          <p:nvPr/>
+        </p:nvCxnSpPr>
+        <p:spPr>
+          <a:xfrm>
+            <a:off x="3528100" y="3061885"/>
+            <a:ext cx="336288" cy="0"/>
+          </a:xfrm>
+          <a:prstGeom prst="straightConnector1">
+            <a:avLst/>
+          </a:prstGeom>
+          <a:ln>
+            <a:solidFill>
+              <a:schemeClr val="tx1"/>
+            </a:solidFill>
+            <a:tailEnd type="arrow"/>
+          </a:ln>
+          <a:effectLst/>
+        </p:spPr>
+        <p:style>
+          <a:lnRef idx="2">
+            <a:schemeClr val="accent1"/>
+          </a:lnRef>
+          <a:fillRef idx="0">
+            <a:schemeClr val="accent1"/>
+          </a:fillRef>
+          <a:effectRef idx="1">
+            <a:schemeClr val="accent1"/>
+          </a:effectRef>
+          <a:fontRef idx="minor">
+            <a:schemeClr val="tx1"/>
+          </a:fontRef>
+        </p:style>
+      </p:cxnSp>
+      <p:cxnSp>
+        <p:nvCxnSpPr>
+          <p:cNvPr id="92" name="Straight Arrow Connector 91"/>
+          <p:cNvCxnSpPr/>
+          <p:nvPr/>
+        </p:nvCxnSpPr>
+        <p:spPr>
+          <a:xfrm>
+            <a:off x="3528100" y="3477330"/>
+            <a:ext cx="336288" cy="0"/>
+          </a:xfrm>
+          <a:prstGeom prst="straightConnector1">
+            <a:avLst/>
+          </a:prstGeom>
+          <a:ln>
+            <a:solidFill>
+              <a:schemeClr val="tx1"/>
+            </a:solidFill>
+            <a:tailEnd type="arrow"/>
+          </a:ln>
+          <a:effectLst/>
+        </p:spPr>
+        <p:style>
+          <a:lnRef idx="2">
+            <a:schemeClr val="accent1"/>
+          </a:lnRef>
+          <a:fillRef idx="0">
+            <a:schemeClr val="accent1"/>
+          </a:fillRef>
+          <a:effectRef idx="1">
+            <a:schemeClr val="accent1"/>
+          </a:effectRef>
+          <a:fontRef idx="minor">
+            <a:schemeClr val="tx1"/>
+          </a:fontRef>
+        </p:style>
+      </p:cxnSp>
+      <p:cxnSp>
+        <p:nvCxnSpPr>
+          <p:cNvPr id="93" name="Straight Arrow Connector 92"/>
+          <p:cNvCxnSpPr/>
+          <p:nvPr/>
+        </p:nvCxnSpPr>
+        <p:spPr>
+          <a:xfrm>
+            <a:off x="3528100" y="3724918"/>
+            <a:ext cx="336288" cy="0"/>
+          </a:xfrm>
+          <a:prstGeom prst="straightConnector1">
+            <a:avLst/>
+          </a:prstGeom>
+          <a:ln>
+            <a:solidFill>
+              <a:schemeClr val="tx1"/>
+            </a:solidFill>
+            <a:tailEnd type="arrow"/>
+          </a:ln>
+          <a:effectLst/>
+        </p:spPr>
+        <p:style>
+          <a:lnRef idx="2">
+            <a:schemeClr val="accent1"/>
+          </a:lnRef>
+          <a:fillRef idx="0">
+            <a:schemeClr val="accent1"/>
+          </a:fillRef>
+          <a:effectRef idx="1">
+            <a:schemeClr val="accent1"/>
+          </a:effectRef>
+          <a:fontRef idx="minor">
+            <a:schemeClr val="tx1"/>
+          </a:fontRef>
+        </p:style>
+      </p:cxnSp>
+      <p:cxnSp>
+        <p:nvCxnSpPr>
+          <p:cNvPr id="94" name="Straight Arrow Connector 93"/>
+          <p:cNvCxnSpPr/>
+          <p:nvPr/>
+        </p:nvCxnSpPr>
+        <p:spPr>
+          <a:xfrm>
+            <a:off x="3528100" y="4022969"/>
+            <a:ext cx="336288" cy="0"/>
+          </a:xfrm>
+          <a:prstGeom prst="straightConnector1">
+            <a:avLst/>
+          </a:prstGeom>
+          <a:ln>
+            <a:solidFill>
+              <a:schemeClr val="tx1"/>
+            </a:solidFill>
+            <a:tailEnd type="arrow"/>
+          </a:ln>
+          <a:effectLst/>
+        </p:spPr>
+        <p:style>
+          <a:lnRef idx="2">
+            <a:schemeClr val="accent1"/>
+          </a:lnRef>
+          <a:fillRef idx="0">
+            <a:schemeClr val="accent1"/>
+          </a:fillRef>
+          <a:effectRef idx="1">
+            <a:schemeClr val="accent1"/>
+          </a:effectRef>
+          <a:fontRef idx="minor">
+            <a:schemeClr val="tx1"/>
+          </a:fontRef>
+        </p:style>
+      </p:cxnSp>
+      <p:cxnSp>
+        <p:nvCxnSpPr>
+          <p:cNvPr id="95" name="Straight Arrow Connector 94"/>
+          <p:cNvCxnSpPr/>
+          <p:nvPr/>
+        </p:nvCxnSpPr>
+        <p:spPr>
+          <a:xfrm>
+            <a:off x="3512356" y="4390097"/>
+            <a:ext cx="336288" cy="0"/>
+          </a:xfrm>
+          <a:prstGeom prst="straightConnector1">
+            <a:avLst/>
+          </a:prstGeom>
+          <a:ln>
+            <a:solidFill>
+              <a:schemeClr val="tx1"/>
+            </a:solidFill>
+            <a:tailEnd type="arrow"/>
+          </a:ln>
+          <a:effectLst/>
+        </p:spPr>
+        <p:style>
+          <a:lnRef idx="2">
+            <a:schemeClr val="accent1"/>
+          </a:lnRef>
+          <a:fillRef idx="0">
+            <a:schemeClr val="accent1"/>
+          </a:fillRef>
+          <a:effectRef idx="1">
+            <a:schemeClr val="accent1"/>
+          </a:effectRef>
+          <a:fontRef idx="minor">
+            <a:schemeClr val="tx1"/>
+          </a:fontRef>
+        </p:style>
+      </p:cxnSp>
+      <p:sp>
+        <p:nvSpPr>
+          <p:cNvPr id="96" name="Rectangle 95"/>
+          <p:cNvSpPr/>
+          <p:nvPr/>
+        </p:nvSpPr>
+        <p:spPr>
+          <a:xfrm>
+            <a:off x="3864389" y="2942897"/>
+            <a:ext cx="1161487" cy="260110"/>
+          </a:xfrm>
+          <a:prstGeom prst="rect">
+            <a:avLst/>
+          </a:prstGeom>
+          <a:noFill/>
+          <a:ln w="25400">
+            <a:solidFill>
+              <a:schemeClr val="tx1"/>
+            </a:solidFill>
+          </a:ln>
+          <a:effectLst/>
+        </p:spPr>
+        <p:style>
+          <a:lnRef idx="1">
+            <a:schemeClr val="accent1"/>
+          </a:lnRef>
+          <a:fillRef idx="3">
+            <a:schemeClr val="accent1"/>
+          </a:fillRef>
+          <a:effectRef idx="2">
+            <a:schemeClr val="accent1"/>
+          </a:effectRef>
+          <a:fontRef idx="minor">
+            <a:schemeClr val="lt1"/>
+          </a:fontRef>
+        </p:style>
+        <p:txBody>
+          <a:bodyPr rtlCol="0" anchor="ctr"/>
+          <a:lstStyle/>
+          <a:p>
+            <a:pPr algn="ctr"/>
+            <a:endParaRPr lang="en-US"/>
+          </a:p>
+        </p:txBody>
+      </p:sp>
+      <p:sp>
+        <p:nvSpPr>
+          <p:cNvPr id="99" name="Rectangle 98"/>
+          <p:cNvSpPr/>
+          <p:nvPr/>
+        </p:nvSpPr>
+        <p:spPr>
+          <a:xfrm>
+            <a:off x="3887388" y="3280473"/>
+            <a:ext cx="868402" cy="260110"/>
+          </a:xfrm>
+          <a:prstGeom prst="rect">
+            <a:avLst/>
+          </a:prstGeom>
+          <a:noFill/>
+          <a:ln w="25400">
+            <a:solidFill>
+              <a:schemeClr val="tx1"/>
+            </a:solidFill>
+          </a:ln>
+          <a:effectLst/>
+        </p:spPr>
+        <p:style>
+          <a:lnRef idx="1">
+            <a:schemeClr val="accent1"/>
+          </a:lnRef>
+          <a:fillRef idx="3">
+            <a:schemeClr val="accent1"/>
+          </a:fillRef>
+          <a:effectRef idx="2">
+            <a:schemeClr val="accent1"/>
+          </a:effectRef>
+          <a:fontRef idx="minor">
+            <a:schemeClr val="lt1"/>
+          </a:fontRef>
+        </p:style>
+        <p:txBody>
+          <a:bodyPr rtlCol="0" anchor="ctr"/>
+          <a:lstStyle/>
+          <a:p>
+            <a:pPr algn="ctr"/>
+            <a:endParaRPr lang="en-US"/>
+          </a:p>
+        </p:txBody>
+      </p:sp>
+      <p:sp>
+        <p:nvSpPr>
+          <p:cNvPr id="100" name="Rectangle 99"/>
+          <p:cNvSpPr/>
+          <p:nvPr/>
+        </p:nvSpPr>
+        <p:spPr>
+          <a:xfrm>
+            <a:off x="3887388" y="3914626"/>
+            <a:ext cx="541461" cy="217200"/>
+          </a:xfrm>
+          <a:prstGeom prst="rect">
+            <a:avLst/>
+          </a:prstGeom>
+          <a:noFill/>
+          <a:ln w="25400">
+            <a:solidFill>
+              <a:schemeClr val="tx1"/>
+            </a:solidFill>
+          </a:ln>
+          <a:effectLst/>
+        </p:spPr>
+        <p:style>
+          <a:lnRef idx="1">
+            <a:schemeClr val="accent1"/>
+          </a:lnRef>
+          <a:fillRef idx="3">
+            <a:schemeClr val="accent1"/>
+          </a:fillRef>
+          <a:effectRef idx="2">
+            <a:schemeClr val="accent1"/>
+          </a:effectRef>
+          <a:fontRef idx="minor">
+            <a:schemeClr val="lt1"/>
+          </a:fontRef>
+        </p:style>
+        <p:txBody>
+          <a:bodyPr rtlCol="0" anchor="ctr"/>
+          <a:lstStyle/>
+          <a:p>
+            <a:pPr algn="ctr"/>
+            <a:endParaRPr lang="en-US"/>
+          </a:p>
+        </p:txBody>
+      </p:sp>
+      <p:sp>
+        <p:nvSpPr>
+          <p:cNvPr id="101" name="Rectangle 100"/>
+          <p:cNvSpPr/>
+          <p:nvPr/>
+        </p:nvSpPr>
+        <p:spPr>
+          <a:xfrm>
+            <a:off x="3887388" y="3594863"/>
+            <a:ext cx="997372" cy="260110"/>
+          </a:xfrm>
+          <a:prstGeom prst="rect">
+            <a:avLst/>
+          </a:prstGeom>
+          <a:noFill/>
+          <a:ln w="25400">
+            <a:solidFill>
+              <a:schemeClr val="tx1"/>
+            </a:solidFill>
+          </a:ln>
+          <a:effectLst/>
+        </p:spPr>
+        <p:style>
+          <a:lnRef idx="1">
+            <a:schemeClr val="accent1"/>
+          </a:lnRef>
+          <a:fillRef idx="3">
+            <a:schemeClr val="accent1"/>
+          </a:fillRef>
+          <a:effectRef idx="2">
+            <a:schemeClr val="accent1"/>
+          </a:effectRef>
+          <a:fontRef idx="minor">
+            <a:schemeClr val="lt1"/>
+          </a:fontRef>
+        </p:style>
+        <p:txBody>
+          <a:bodyPr rtlCol="0" anchor="ctr"/>
+          <a:lstStyle/>
+          <a:p>
+            <a:pPr algn="ctr"/>
+            <a:endParaRPr lang="en-US"/>
+          </a:p>
+        </p:txBody>
+      </p:sp>
+      <p:sp>
+        <p:nvSpPr>
+          <p:cNvPr id="102" name="Rectangle 101"/>
+          <p:cNvSpPr/>
+          <p:nvPr/>
+        </p:nvSpPr>
+        <p:spPr>
+          <a:xfrm>
+            <a:off x="3887387" y="4246861"/>
+            <a:ext cx="1138489" cy="235410"/>
+          </a:xfrm>
+          <a:prstGeom prst="rect">
+            <a:avLst/>
+          </a:prstGeom>
+          <a:noFill/>
+          <a:ln w="25400">
+            <a:solidFill>
+              <a:schemeClr val="tx1"/>
+            </a:solidFill>
+          </a:ln>
+          <a:effectLst/>
+        </p:spPr>
+        <p:style>
+          <a:lnRef idx="1">
+            <a:schemeClr val="accent1"/>
+          </a:lnRef>
+          <a:fillRef idx="3">
+            <a:schemeClr val="accent1"/>
+          </a:fillRef>
+          <a:effectRef idx="2">
+            <a:schemeClr val="accent1"/>
+          </a:effectRef>
+          <a:fontRef idx="minor">
+            <a:schemeClr val="lt1"/>
+          </a:fontRef>
+        </p:style>
+        <p:txBody>
+          <a:bodyPr rtlCol="0" anchor="ctr"/>
+          <a:lstStyle/>
+          <a:p>
+            <a:pPr algn="ctr"/>
+            <a:endParaRPr lang="en-US"/>
+          </a:p>
+        </p:txBody>
+      </p:sp>
+      <p:cxnSp>
+        <p:nvCxnSpPr>
+          <p:cNvPr id="108" name="Straight Arrow Connector 107"/>
+          <p:cNvCxnSpPr>
+            <a:endCxn id="66" idx="0"/>
+          </p:cNvCxnSpPr>
+          <p:nvPr/>
+        </p:nvCxnSpPr>
+        <p:spPr>
+          <a:xfrm>
+            <a:off x="5138348" y="3676509"/>
+            <a:ext cx="356714" cy="0"/>
+          </a:xfrm>
+          <a:prstGeom prst="straightConnector1">
+            <a:avLst/>
+          </a:prstGeom>
+          <a:ln>
+            <a:solidFill>
+              <a:schemeClr val="tx1"/>
+            </a:solidFill>
+            <a:tailEnd type="arrow"/>
+          </a:ln>
+          <a:effectLst/>
+        </p:spPr>
+        <p:style>
+          <a:lnRef idx="2">
+            <a:schemeClr val="accent1"/>
+          </a:lnRef>
+          <a:fillRef idx="0">
+            <a:schemeClr val="accent1"/>
+          </a:fillRef>
+          <a:effectRef idx="1">
+            <a:schemeClr val="accent1"/>
+          </a:effectRef>
+          <a:fontRef idx="minor">
+            <a:schemeClr val="tx1"/>
+          </a:fontRef>
+        </p:style>
+      </p:cxnSp>
+      <p:grpSp>
+        <p:nvGrpSpPr>
+          <p:cNvPr id="116" name="Group 115"/>
+          <p:cNvGrpSpPr/>
+          <p:nvPr/>
+        </p:nvGrpSpPr>
+        <p:grpSpPr>
+          <a:xfrm>
+            <a:off x="1335168" y="3925570"/>
+            <a:ext cx="401636" cy="412511"/>
+            <a:chOff x="7489966" y="477645"/>
+            <a:chExt cx="401636" cy="412511"/>
+          </a:xfrm>
+        </p:grpSpPr>
+        <p:sp>
+          <p:nvSpPr>
+            <p:cNvPr id="114" name="Oval 113"/>
+            <p:cNvSpPr/>
+            <p:nvPr/>
+          </p:nvSpPr>
+          <p:spPr>
+            <a:xfrm>
+              <a:off x="7489966" y="477645"/>
+              <a:ext cx="401636" cy="412511"/>
+            </a:xfrm>
+            <a:prstGeom prst="ellipse">
+              <a:avLst/>
+            </a:prstGeom>
+            <a:noFill/>
+            <a:ln w="22225">
+              <a:solidFill>
+                <a:schemeClr val="tx1"/>
+              </a:solidFill>
+            </a:ln>
+            <a:effectLst/>
+          </p:spPr>
+          <p:style>
+            <a:lnRef idx="1">
+              <a:schemeClr val="accent1"/>
+            </a:lnRef>
+            <a:fillRef idx="3">
+              <a:schemeClr val="accent1"/>
+            </a:fillRef>
+            <a:effectRef idx="2">
+              <a:schemeClr val="accent1"/>
+            </a:effectRef>
+            <a:fontRef idx="minor">
+              <a:schemeClr val="lt1"/>
+            </a:fontRef>
+          </p:style>
+          <p:txBody>
+            <a:bodyPr rtlCol="0" anchor="ctr"/>
+            <a:lstStyle/>
+            <a:p>
+              <a:pPr algn="ctr"/>
+              <a:endParaRPr lang="en-US"/>
+            </a:p>
+          </p:txBody>
+        </p:sp>
+        <p:sp>
+          <p:nvSpPr>
+            <p:cNvPr id="115" name="TextBox 114"/>
+            <p:cNvSpPr txBox="1"/>
+            <p:nvPr/>
+          </p:nvSpPr>
+          <p:spPr>
+            <a:xfrm>
+              <a:off x="7524812" y="477645"/>
+              <a:ext cx="301660" cy="369332"/>
+            </a:xfrm>
+            <a:prstGeom prst="rect">
+              <a:avLst/>
+            </a:prstGeom>
+            <a:noFill/>
+          </p:spPr>
+          <p:txBody>
+            <a:bodyPr wrap="none" rtlCol="0">
+              <a:spAutoFit/>
+            </a:bodyPr>
+            <a:lstStyle/>
+            <a:p>
+              <a:r>
+                <a:rPr lang="en-US" dirty="0" smtClean="0"/>
+                <a:t>1</a:t>
+              </a:r>
+              <a:endParaRPr lang="en-US" dirty="0"/>
+            </a:p>
+          </p:txBody>
+        </p:sp>
+      </p:grpSp>
+      <p:grpSp>
+        <p:nvGrpSpPr>
+          <p:cNvPr id="117" name="Group 116"/>
+          <p:cNvGrpSpPr/>
+          <p:nvPr/>
+        </p:nvGrpSpPr>
+        <p:grpSpPr>
+          <a:xfrm>
+            <a:off x="6889499" y="1812667"/>
+            <a:ext cx="401636" cy="412511"/>
+            <a:chOff x="7489966" y="477645"/>
+            <a:chExt cx="401636" cy="412511"/>
+          </a:xfrm>
+        </p:grpSpPr>
+        <p:sp>
+          <p:nvSpPr>
+            <p:cNvPr id="118" name="Oval 117"/>
+            <p:cNvSpPr/>
+            <p:nvPr/>
+          </p:nvSpPr>
+          <p:spPr>
+            <a:xfrm>
+              <a:off x="7489966" y="477645"/>
+              <a:ext cx="401636" cy="412511"/>
+            </a:xfrm>
+            <a:prstGeom prst="ellipse">
+              <a:avLst/>
+            </a:prstGeom>
+            <a:noFill/>
+            <a:ln w="22225">
+              <a:solidFill>
+                <a:schemeClr val="tx1"/>
+              </a:solidFill>
+            </a:ln>
+            <a:effectLst/>
+          </p:spPr>
+          <p:style>
+            <a:lnRef idx="1">
+              <a:schemeClr val="accent1"/>
+            </a:lnRef>
+            <a:fillRef idx="3">
+              <a:schemeClr val="accent1"/>
+            </a:fillRef>
+            <a:effectRef idx="2">
+              <a:schemeClr val="accent1"/>
+            </a:effectRef>
+            <a:fontRef idx="minor">
+              <a:schemeClr val="lt1"/>
+            </a:fontRef>
+          </p:style>
+          <p:txBody>
+            <a:bodyPr rtlCol="0" anchor="ctr"/>
+            <a:lstStyle/>
+            <a:p>
+              <a:pPr algn="ctr"/>
+              <a:endParaRPr lang="en-US"/>
+            </a:p>
+          </p:txBody>
+        </p:sp>
+        <p:sp>
+          <p:nvSpPr>
+            <p:cNvPr id="119" name="TextBox 118"/>
+            <p:cNvSpPr txBox="1"/>
+            <p:nvPr/>
+          </p:nvSpPr>
+          <p:spPr>
+            <a:xfrm>
+              <a:off x="7524812" y="477645"/>
+              <a:ext cx="301660" cy="369332"/>
+            </a:xfrm>
+            <a:prstGeom prst="rect">
+              <a:avLst/>
+            </a:prstGeom>
+            <a:noFill/>
+          </p:spPr>
+          <p:txBody>
+            <a:bodyPr wrap="none" rtlCol="0">
+              <a:spAutoFit/>
+            </a:bodyPr>
+            <a:lstStyle/>
+            <a:p>
+              <a:r>
+                <a:rPr lang="en-US" dirty="0"/>
+                <a:t>4</a:t>
+              </a:r>
+              <a:endParaRPr lang="en-US" dirty="0"/>
+            </a:p>
+          </p:txBody>
+        </p:sp>
+      </p:grpSp>
+      <p:grpSp>
+        <p:nvGrpSpPr>
+          <p:cNvPr id="120" name="Group 119"/>
+          <p:cNvGrpSpPr/>
+          <p:nvPr/>
+        </p:nvGrpSpPr>
+        <p:grpSpPr>
+          <a:xfrm>
+            <a:off x="6889499" y="3453861"/>
+            <a:ext cx="401636" cy="412511"/>
+            <a:chOff x="7489966" y="477645"/>
+            <a:chExt cx="401636" cy="412511"/>
+          </a:xfrm>
+        </p:grpSpPr>
+        <p:sp>
+          <p:nvSpPr>
+            <p:cNvPr id="121" name="Oval 120"/>
+            <p:cNvSpPr/>
+            <p:nvPr/>
+          </p:nvSpPr>
+          <p:spPr>
+            <a:xfrm>
+              <a:off x="7489966" y="477645"/>
+              <a:ext cx="401636" cy="412511"/>
+            </a:xfrm>
+            <a:prstGeom prst="ellipse">
+              <a:avLst/>
+            </a:prstGeom>
+            <a:noFill/>
+            <a:ln w="22225">
+              <a:solidFill>
+                <a:schemeClr val="tx1"/>
+              </a:solidFill>
+            </a:ln>
+            <a:effectLst/>
+          </p:spPr>
+          <p:style>
+            <a:lnRef idx="1">
+              <a:schemeClr val="accent1"/>
+            </a:lnRef>
+            <a:fillRef idx="3">
+              <a:schemeClr val="accent1"/>
+            </a:fillRef>
+            <a:effectRef idx="2">
+              <a:schemeClr val="accent1"/>
+            </a:effectRef>
+            <a:fontRef idx="minor">
+              <a:schemeClr val="lt1"/>
+            </a:fontRef>
+          </p:style>
+          <p:txBody>
+            <a:bodyPr rtlCol="0" anchor="ctr"/>
+            <a:lstStyle/>
+            <a:p>
+              <a:pPr algn="ctr"/>
+              <a:endParaRPr lang="en-US"/>
+            </a:p>
+          </p:txBody>
+        </p:sp>
+        <p:sp>
+          <p:nvSpPr>
+            <p:cNvPr id="122" name="TextBox 121"/>
+            <p:cNvSpPr txBox="1"/>
+            <p:nvPr/>
+          </p:nvSpPr>
+          <p:spPr>
+            <a:xfrm>
+              <a:off x="7524812" y="477645"/>
+              <a:ext cx="301660" cy="369332"/>
+            </a:xfrm>
+            <a:prstGeom prst="rect">
+              <a:avLst/>
+            </a:prstGeom>
+            <a:noFill/>
+          </p:spPr>
+          <p:txBody>
+            <a:bodyPr wrap="none" rtlCol="0">
+              <a:spAutoFit/>
+            </a:bodyPr>
+            <a:lstStyle/>
+            <a:p>
+              <a:r>
+                <a:rPr lang="en-US" dirty="0" smtClean="0"/>
+                <a:t>7</a:t>
+              </a:r>
+              <a:endParaRPr lang="en-US" dirty="0"/>
+            </a:p>
+          </p:txBody>
+        </p:sp>
+      </p:grpSp>
+      <p:cxnSp>
+        <p:nvCxnSpPr>
+          <p:cNvPr id="123" name="Straight Arrow Connector 122"/>
+          <p:cNvCxnSpPr/>
+          <p:nvPr/>
+        </p:nvCxnSpPr>
+        <p:spPr>
+          <a:xfrm flipH="1">
+            <a:off x="1736804" y="4153538"/>
+            <a:ext cx="445056" cy="0"/>
+          </a:xfrm>
+          <a:prstGeom prst="straightConnector1">
+            <a:avLst/>
+          </a:prstGeom>
+          <a:ln>
+            <a:solidFill>
+              <a:schemeClr val="tx1"/>
+            </a:solidFill>
+            <a:tailEnd type="arrow"/>
+          </a:ln>
+          <a:effectLst/>
+        </p:spPr>
+        <p:style>
+          <a:lnRef idx="2">
+            <a:schemeClr val="accent1"/>
+          </a:lnRef>
+          <a:fillRef idx="0">
+            <a:schemeClr val="accent1"/>
+          </a:fillRef>
+          <a:effectRef idx="1">
+            <a:schemeClr val="accent1"/>
+          </a:effectRef>
+          <a:fontRef idx="minor">
+            <a:schemeClr val="tx1"/>
+          </a:fontRef>
+        </p:style>
+      </p:cxnSp>
+    </p:spTree>
+    <p:extLst>
+      <p:ext uri="{BB962C8B-B14F-4D97-AF65-F5344CB8AC3E}">
+        <p14:creationId xmlns:p14="http://schemas.microsoft.com/office/powerpoint/2010/main" val="2909022565"/>
       </p:ext>
     </p:extLst>
   </p:cSld>

</xml_diff>

<commit_message>
modified paper with case studies complete overhaul of sections, removing ephasis on testing moving to debugging instead
</commit_message>
<xml_diff>
--- a/paper/figs/images.pptx
+++ b/paper/figs/images.pptx
@@ -11,6 +11,7 @@
     <p:sldId id="259" r:id="rId5"/>
     <p:sldId id="257" r:id="rId6"/>
     <p:sldId id="260" r:id="rId7"/>
+    <p:sldId id="262" r:id="rId8"/>
   </p:sldIdLst>
   <p:sldSz cx="9144000" cy="6858000" type="screen4x3"/>
   <p:notesSz cx="6858000" cy="9144000"/>
@@ -293,7 +294,7 @@
           <a:p>
             <a:fld id="{06D27FD6-7394-0F44-B86B-46BBC2D874F2}" type="datetimeFigureOut">
               <a:rPr lang="en-US" smtClean="0"/>
-              <a:t>9/26/14</a:t>
+              <a:t>10/11/14</a:t>
             </a:fld>
             <a:endParaRPr lang="en-US"/>
           </a:p>
@@ -463,7 +464,7 @@
           <a:p>
             <a:fld id="{06D27FD6-7394-0F44-B86B-46BBC2D874F2}" type="datetimeFigureOut">
               <a:rPr lang="en-US" smtClean="0"/>
-              <a:t>9/26/14</a:t>
+              <a:t>10/11/14</a:t>
             </a:fld>
             <a:endParaRPr lang="en-US"/>
           </a:p>
@@ -643,7 +644,7 @@
           <a:p>
             <a:fld id="{06D27FD6-7394-0F44-B86B-46BBC2D874F2}" type="datetimeFigureOut">
               <a:rPr lang="en-US" smtClean="0"/>
-              <a:t>9/26/14</a:t>
+              <a:t>10/11/14</a:t>
             </a:fld>
             <a:endParaRPr lang="en-US"/>
           </a:p>
@@ -813,7 +814,7 @@
           <a:p>
             <a:fld id="{06D27FD6-7394-0F44-B86B-46BBC2D874F2}" type="datetimeFigureOut">
               <a:rPr lang="en-US" smtClean="0"/>
-              <a:t>9/26/14</a:t>
+              <a:t>10/11/14</a:t>
             </a:fld>
             <a:endParaRPr lang="en-US"/>
           </a:p>
@@ -1059,7 +1060,7 @@
           <a:p>
             <a:fld id="{06D27FD6-7394-0F44-B86B-46BBC2D874F2}" type="datetimeFigureOut">
               <a:rPr lang="en-US" smtClean="0"/>
-              <a:t>9/26/14</a:t>
+              <a:t>10/11/14</a:t>
             </a:fld>
             <a:endParaRPr lang="en-US"/>
           </a:p>
@@ -1347,7 +1348,7 @@
           <a:p>
             <a:fld id="{06D27FD6-7394-0F44-B86B-46BBC2D874F2}" type="datetimeFigureOut">
               <a:rPr lang="en-US" smtClean="0"/>
-              <a:t>9/26/14</a:t>
+              <a:t>10/11/14</a:t>
             </a:fld>
             <a:endParaRPr lang="en-US"/>
           </a:p>
@@ -1769,7 +1770,7 @@
           <a:p>
             <a:fld id="{06D27FD6-7394-0F44-B86B-46BBC2D874F2}" type="datetimeFigureOut">
               <a:rPr lang="en-US" smtClean="0"/>
-              <a:t>9/26/14</a:t>
+              <a:t>10/11/14</a:t>
             </a:fld>
             <a:endParaRPr lang="en-US"/>
           </a:p>
@@ -1887,7 +1888,7 @@
           <a:p>
             <a:fld id="{06D27FD6-7394-0F44-B86B-46BBC2D874F2}" type="datetimeFigureOut">
               <a:rPr lang="en-US" smtClean="0"/>
-              <a:t>9/26/14</a:t>
+              <a:t>10/11/14</a:t>
             </a:fld>
             <a:endParaRPr lang="en-US"/>
           </a:p>
@@ -1982,7 +1983,7 @@
           <a:p>
             <a:fld id="{06D27FD6-7394-0F44-B86B-46BBC2D874F2}" type="datetimeFigureOut">
               <a:rPr lang="en-US" smtClean="0"/>
-              <a:t>9/26/14</a:t>
+              <a:t>10/11/14</a:t>
             </a:fld>
             <a:endParaRPr lang="en-US"/>
           </a:p>
@@ -2259,7 +2260,7 @@
           <a:p>
             <a:fld id="{06D27FD6-7394-0F44-B86B-46BBC2D874F2}" type="datetimeFigureOut">
               <a:rPr lang="en-US" smtClean="0"/>
-              <a:t>9/26/14</a:t>
+              <a:t>10/11/14</a:t>
             </a:fld>
             <a:endParaRPr lang="en-US"/>
           </a:p>
@@ -2512,7 +2513,7 @@
           <a:p>
             <a:fld id="{06D27FD6-7394-0F44-B86B-46BBC2D874F2}" type="datetimeFigureOut">
               <a:rPr lang="en-US" smtClean="0"/>
-              <a:t>9/26/14</a:t>
+              <a:t>10/11/14</a:t>
             </a:fld>
             <a:endParaRPr lang="en-US"/>
           </a:p>
@@ -2725,7 +2726,7 @@
           <a:p>
             <a:fld id="{06D27FD6-7394-0F44-B86B-46BBC2D874F2}" type="datetimeFigureOut">
               <a:rPr lang="en-US" smtClean="0"/>
-              <a:t>9/26/14</a:t>
+              <a:t>10/11/14</a:t>
             </a:fld>
             <a:endParaRPr lang="en-US"/>
           </a:p>
@@ -3108,8 +3109,8 @@
         </p:nvSpPr>
         <p:spPr>
           <a:xfrm>
-            <a:off x="2442380" y="3520803"/>
-            <a:ext cx="3006842" cy="1559599"/>
+            <a:off x="3679422" y="3444811"/>
+            <a:ext cx="1769799" cy="1635591"/>
           </a:xfrm>
           <a:prstGeom prst="rect">
             <a:avLst/>
@@ -4146,44 +4147,6 @@
             <a:p>
               <a:pPr algn="ctr"/>
               <a:endParaRPr lang="en-US"/>
-            </a:p>
-          </p:txBody>
-        </p:sp>
-        <p:sp>
-          <p:nvSpPr>
-            <p:cNvPr id="71" name="TextBox 70"/>
-            <p:cNvSpPr txBox="1"/>
-            <p:nvPr/>
-          </p:nvSpPr>
-          <p:spPr>
-            <a:xfrm>
-              <a:off x="2659479" y="4163791"/>
-              <a:ext cx="1367732" cy="523220"/>
-            </a:xfrm>
-            <a:prstGeom prst="rect">
-              <a:avLst/>
-            </a:prstGeom>
-            <a:noFill/>
-          </p:spPr>
-          <p:txBody>
-            <a:bodyPr wrap="square" rtlCol="0">
-              <a:spAutoFit/>
-            </a:bodyPr>
-            <a:lstStyle/>
-            <a:p>
-              <a:pPr algn="ctr"/>
-              <a:r>
-                <a:rPr lang="en-US" sz="1400" i="1" dirty="0" smtClean="0"/>
-                <a:t>Sandbox</a:t>
-              </a:r>
-            </a:p>
-            <a:p>
-              <a:pPr algn="ctr"/>
-              <a:r>
-                <a:rPr lang="en-US" sz="1400" i="1" dirty="0" smtClean="0"/>
-                <a:t>Backend Server</a:t>
-              </a:r>
-              <a:endParaRPr lang="en-US" sz="1200" i="1" dirty="0"/>
             </a:p>
           </p:txBody>
         </p:sp>
@@ -10976,6 +10939,1028 @@
     <p:extLst>
       <p:ext uri="{BB962C8B-B14F-4D97-AF65-F5344CB8AC3E}">
         <p14:creationId xmlns:p14="http://schemas.microsoft.com/office/powerpoint/2010/main" val="1856684969"/>
+      </p:ext>
+    </p:extLst>
+  </p:cSld>
+  <p:clrMapOvr>
+    <a:masterClrMapping/>
+  </p:clrMapOvr>
+</p:sld>
+</file>
+
+<file path=ppt/slides/slide7.xml><?xml version="1.0" encoding="utf-8"?>
+<p:sld xmlns:a="http://schemas.openxmlformats.org/drawingml/2006/main" xmlns:r="http://schemas.openxmlformats.org/officeDocument/2006/relationships" xmlns:p="http://schemas.openxmlformats.org/presentationml/2006/main">
+  <p:cSld>
+    <p:spTree>
+      <p:nvGrpSpPr>
+        <p:cNvPr id="1" name=""/>
+        <p:cNvGrpSpPr/>
+        <p:nvPr/>
+      </p:nvGrpSpPr>
+      <p:grpSpPr>
+        <a:xfrm>
+          <a:off x="0" y="0"/>
+          <a:ext cx="0" cy="0"/>
+          <a:chOff x="0" y="0"/>
+          <a:chExt cx="0" cy="0"/>
+        </a:xfrm>
+      </p:grpSpPr>
+      <p:grpSp>
+        <p:nvGrpSpPr>
+          <p:cNvPr id="33" name="Group 32"/>
+          <p:cNvGrpSpPr/>
+          <p:nvPr/>
+        </p:nvGrpSpPr>
+        <p:grpSpPr>
+          <a:xfrm>
+            <a:off x="3777229" y="3611715"/>
+            <a:ext cx="4984335" cy="1774985"/>
+            <a:chOff x="4575954" y="3046761"/>
+            <a:chExt cx="4984335" cy="1774985"/>
+          </a:xfrm>
+        </p:grpSpPr>
+        <p:sp>
+          <p:nvSpPr>
+            <p:cNvPr id="8" name="Rectangle 7"/>
+            <p:cNvSpPr/>
+            <p:nvPr/>
+          </p:nvSpPr>
+          <p:spPr>
+            <a:xfrm>
+              <a:off x="4575954" y="3396042"/>
+              <a:ext cx="1253346" cy="592584"/>
+            </a:xfrm>
+            <a:prstGeom prst="rect">
+              <a:avLst/>
+            </a:prstGeom>
+            <a:noFill/>
+            <a:ln w="25400">
+              <a:solidFill>
+                <a:schemeClr val="tx1"/>
+              </a:solidFill>
+            </a:ln>
+            <a:effectLst/>
+          </p:spPr>
+          <p:style>
+            <a:lnRef idx="1">
+              <a:schemeClr val="accent1"/>
+            </a:lnRef>
+            <a:fillRef idx="3">
+              <a:schemeClr val="accent1"/>
+            </a:fillRef>
+            <a:effectRef idx="2">
+              <a:schemeClr val="accent1"/>
+            </a:effectRef>
+            <a:fontRef idx="minor">
+              <a:schemeClr val="lt1"/>
+            </a:fontRef>
+          </p:style>
+          <p:txBody>
+            <a:bodyPr rtlCol="0" anchor="ctr"/>
+            <a:lstStyle/>
+            <a:p>
+              <a:pPr algn="ctr"/>
+              <a:r>
+                <a:rPr lang="en-US" dirty="0" smtClean="0">
+                  <a:solidFill>
+                    <a:schemeClr val="tx1"/>
+                  </a:solidFill>
+                </a:rPr>
+                <a:t>Webserver</a:t>
+              </a:r>
+              <a:endParaRPr lang="en-US" dirty="0">
+                <a:solidFill>
+                  <a:schemeClr val="tx1"/>
+                </a:solidFill>
+              </a:endParaRPr>
+            </a:p>
+          </p:txBody>
+        </p:sp>
+        <p:cxnSp>
+          <p:nvCxnSpPr>
+            <p:cNvPr id="10" name="Straight Arrow Connector 9"/>
+            <p:cNvCxnSpPr>
+              <a:stCxn id="8" idx="3"/>
+              <a:endCxn id="12" idx="1"/>
+            </p:cNvCxnSpPr>
+            <p:nvPr/>
+          </p:nvCxnSpPr>
+          <p:spPr>
+            <a:xfrm>
+              <a:off x="5829300" y="3692334"/>
+              <a:ext cx="397036" cy="0"/>
+            </a:xfrm>
+            <a:prstGeom prst="straightConnector1">
+              <a:avLst/>
+            </a:prstGeom>
+            <a:ln>
+              <a:solidFill>
+                <a:schemeClr val="tx1"/>
+              </a:solidFill>
+              <a:headEnd type="arrow"/>
+              <a:tailEnd type="arrow"/>
+            </a:ln>
+            <a:effectLst/>
+          </p:spPr>
+          <p:style>
+            <a:lnRef idx="2">
+              <a:schemeClr val="accent1"/>
+            </a:lnRef>
+            <a:fillRef idx="0">
+              <a:schemeClr val="accent1"/>
+            </a:fillRef>
+            <a:effectRef idx="1">
+              <a:schemeClr val="accent1"/>
+            </a:effectRef>
+            <a:fontRef idx="minor">
+              <a:schemeClr val="tx1"/>
+            </a:fontRef>
+          </p:style>
+        </p:cxnSp>
+        <p:sp>
+          <p:nvSpPr>
+            <p:cNvPr id="12" name="Rounded Rectangle 11"/>
+            <p:cNvSpPr/>
+            <p:nvPr/>
+          </p:nvSpPr>
+          <p:spPr>
+            <a:xfrm>
+              <a:off x="6226336" y="3396042"/>
+              <a:ext cx="1310640" cy="592584"/>
+            </a:xfrm>
+            <a:prstGeom prst="roundRect">
+              <a:avLst/>
+            </a:prstGeom>
+            <a:noFill/>
+            <a:ln>
+              <a:solidFill>
+                <a:schemeClr val="tx1"/>
+              </a:solidFill>
+            </a:ln>
+            <a:effectLst/>
+          </p:spPr>
+          <p:style>
+            <a:lnRef idx="1">
+              <a:schemeClr val="accent1"/>
+            </a:lnRef>
+            <a:fillRef idx="3">
+              <a:schemeClr val="accent1"/>
+            </a:fillRef>
+            <a:effectRef idx="2">
+              <a:schemeClr val="accent1"/>
+            </a:effectRef>
+            <a:fontRef idx="minor">
+              <a:schemeClr val="lt1"/>
+            </a:fontRef>
+          </p:style>
+          <p:txBody>
+            <a:bodyPr rtlCol="0" anchor="ctr"/>
+            <a:lstStyle/>
+            <a:p>
+              <a:pPr algn="ctr"/>
+              <a:r>
+                <a:rPr lang="en-US" dirty="0" smtClean="0">
+                  <a:solidFill>
+                    <a:srgbClr val="000000"/>
+                  </a:solidFill>
+                </a:rPr>
+                <a:t>Backend-Server</a:t>
+              </a:r>
+              <a:endParaRPr lang="en-US" dirty="0">
+                <a:solidFill>
+                  <a:srgbClr val="000000"/>
+                </a:solidFill>
+              </a:endParaRPr>
+            </a:p>
+          </p:txBody>
+        </p:sp>
+        <p:sp>
+          <p:nvSpPr>
+            <p:cNvPr id="14" name="Rounded Rectangle 13"/>
+            <p:cNvSpPr/>
+            <p:nvPr/>
+          </p:nvSpPr>
+          <p:spPr>
+            <a:xfrm>
+              <a:off x="6226336" y="4229162"/>
+              <a:ext cx="1310640" cy="592584"/>
+            </a:xfrm>
+            <a:prstGeom prst="roundRect">
+              <a:avLst/>
+            </a:prstGeom>
+            <a:noFill/>
+            <a:ln>
+              <a:solidFill>
+                <a:schemeClr val="tx1"/>
+              </a:solidFill>
+            </a:ln>
+            <a:effectLst/>
+          </p:spPr>
+          <p:style>
+            <a:lnRef idx="1">
+              <a:schemeClr val="accent1"/>
+            </a:lnRef>
+            <a:fillRef idx="3">
+              <a:schemeClr val="accent1"/>
+            </a:fillRef>
+            <a:effectRef idx="2">
+              <a:schemeClr val="accent1"/>
+            </a:effectRef>
+            <a:fontRef idx="minor">
+              <a:schemeClr val="lt1"/>
+            </a:fontRef>
+          </p:style>
+          <p:txBody>
+            <a:bodyPr rtlCol="0" anchor="ctr"/>
+            <a:lstStyle/>
+            <a:p>
+              <a:pPr algn="ctr"/>
+              <a:r>
+                <a:rPr lang="en-US" dirty="0" smtClean="0">
+                  <a:solidFill>
+                    <a:srgbClr val="000000"/>
+                  </a:solidFill>
+                </a:rPr>
+                <a:t>Test container</a:t>
+              </a:r>
+              <a:endParaRPr lang="en-US" dirty="0">
+                <a:solidFill>
+                  <a:srgbClr val="000000"/>
+                </a:solidFill>
+              </a:endParaRPr>
+            </a:p>
+          </p:txBody>
+        </p:sp>
+        <p:cxnSp>
+          <p:nvCxnSpPr>
+            <p:cNvPr id="15" name="Straight Arrow Connector 14"/>
+            <p:cNvCxnSpPr>
+              <a:stCxn id="8" idx="3"/>
+              <a:endCxn id="14" idx="1"/>
+            </p:cNvCxnSpPr>
+            <p:nvPr/>
+          </p:nvCxnSpPr>
+          <p:spPr>
+            <a:xfrm>
+              <a:off x="5829300" y="3692334"/>
+              <a:ext cx="397036" cy="833120"/>
+            </a:xfrm>
+            <a:prstGeom prst="straightConnector1">
+              <a:avLst/>
+            </a:prstGeom>
+            <a:ln>
+              <a:solidFill>
+                <a:schemeClr val="tx1"/>
+              </a:solidFill>
+              <a:headEnd type="arrow"/>
+              <a:tailEnd type="arrow"/>
+            </a:ln>
+            <a:effectLst/>
+          </p:spPr>
+          <p:style>
+            <a:lnRef idx="2">
+              <a:schemeClr val="accent1"/>
+            </a:lnRef>
+            <a:fillRef idx="0">
+              <a:schemeClr val="accent1"/>
+            </a:fillRef>
+            <a:effectRef idx="1">
+              <a:schemeClr val="accent1"/>
+            </a:effectRef>
+            <a:fontRef idx="minor">
+              <a:schemeClr val="tx1"/>
+            </a:fontRef>
+          </p:style>
+        </p:cxnSp>
+        <p:pic>
+          <p:nvPicPr>
+            <p:cNvPr id="18" name="Picture 17"/>
+            <p:cNvPicPr>
+              <a:picLocks noChangeAspect="1"/>
+            </p:cNvPicPr>
+            <p:nvPr/>
+          </p:nvPicPr>
+          <p:blipFill rotWithShape="1">
+            <a:blip r:embed="rId2"/>
+            <a:srcRect l="-1" r="63002"/>
+            <a:stretch/>
+          </p:blipFill>
+          <p:spPr>
+            <a:xfrm>
+              <a:off x="7940785" y="3046761"/>
+              <a:ext cx="969264" cy="1508760"/>
+            </a:xfrm>
+            <a:prstGeom prst="rect">
+              <a:avLst/>
+            </a:prstGeom>
+          </p:spPr>
+        </p:pic>
+        <p:cxnSp>
+          <p:nvCxnSpPr>
+            <p:cNvPr id="20" name="Straight Connector 19"/>
+            <p:cNvCxnSpPr/>
+            <p:nvPr/>
+          </p:nvCxnSpPr>
+          <p:spPr>
+            <a:xfrm flipV="1">
+              <a:off x="7444740" y="3108444"/>
+              <a:ext cx="496045" cy="1120718"/>
+            </a:xfrm>
+            <a:prstGeom prst="line">
+              <a:avLst/>
+            </a:prstGeom>
+            <a:ln>
+              <a:solidFill>
+                <a:schemeClr val="tx1"/>
+              </a:solidFill>
+              <a:prstDash val="sysDot"/>
+            </a:ln>
+            <a:effectLst/>
+          </p:spPr>
+          <p:style>
+            <a:lnRef idx="2">
+              <a:schemeClr val="accent1"/>
+            </a:lnRef>
+            <a:fillRef idx="0">
+              <a:schemeClr val="accent1"/>
+            </a:fillRef>
+            <a:effectRef idx="1">
+              <a:schemeClr val="accent1"/>
+            </a:effectRef>
+            <a:fontRef idx="minor">
+              <a:schemeClr val="tx1"/>
+            </a:fontRef>
+          </p:style>
+        </p:cxnSp>
+        <p:cxnSp>
+          <p:nvCxnSpPr>
+            <p:cNvPr id="23" name="Straight Connector 22"/>
+            <p:cNvCxnSpPr/>
+            <p:nvPr/>
+          </p:nvCxnSpPr>
+          <p:spPr>
+            <a:xfrm flipV="1">
+              <a:off x="7444740" y="4555521"/>
+              <a:ext cx="496045" cy="266225"/>
+            </a:xfrm>
+            <a:prstGeom prst="line">
+              <a:avLst/>
+            </a:prstGeom>
+            <a:ln>
+              <a:solidFill>
+                <a:schemeClr val="tx1"/>
+              </a:solidFill>
+              <a:prstDash val="sysDot"/>
+            </a:ln>
+            <a:effectLst/>
+          </p:spPr>
+          <p:style>
+            <a:lnRef idx="2">
+              <a:schemeClr val="accent1"/>
+            </a:lnRef>
+            <a:fillRef idx="0">
+              <a:schemeClr val="accent1"/>
+            </a:fillRef>
+            <a:effectRef idx="1">
+              <a:schemeClr val="accent1"/>
+            </a:effectRef>
+            <a:fontRef idx="minor">
+              <a:schemeClr val="tx1"/>
+            </a:fontRef>
+          </p:style>
+        </p:cxnSp>
+        <p:sp>
+          <p:nvSpPr>
+            <p:cNvPr id="28" name="Down Arrow 27"/>
+            <p:cNvSpPr/>
+            <p:nvPr/>
+          </p:nvSpPr>
+          <p:spPr>
+            <a:xfrm>
+              <a:off x="6824980" y="3988626"/>
+              <a:ext cx="162560" cy="240536"/>
+            </a:xfrm>
+            <a:prstGeom prst="downArrow">
+              <a:avLst/>
+            </a:prstGeom>
+            <a:noFill/>
+            <a:ln>
+              <a:solidFill>
+                <a:schemeClr val="tx1"/>
+              </a:solidFill>
+            </a:ln>
+            <a:effectLst/>
+          </p:spPr>
+          <p:style>
+            <a:lnRef idx="1">
+              <a:schemeClr val="accent1"/>
+            </a:lnRef>
+            <a:fillRef idx="3">
+              <a:schemeClr val="accent1"/>
+            </a:fillRef>
+            <a:effectRef idx="2">
+              <a:schemeClr val="accent1"/>
+            </a:effectRef>
+            <a:fontRef idx="minor">
+              <a:schemeClr val="lt1"/>
+            </a:fontRef>
+          </p:style>
+          <p:txBody>
+            <a:bodyPr rtlCol="0" anchor="ctr"/>
+            <a:lstStyle/>
+            <a:p>
+              <a:pPr algn="ctr"/>
+              <a:endParaRPr lang="en-US"/>
+            </a:p>
+          </p:txBody>
+        </p:sp>
+        <p:pic>
+          <p:nvPicPr>
+            <p:cNvPr id="3" name="Picture 2"/>
+            <p:cNvPicPr>
+              <a:picLocks noChangeAspect="1"/>
+            </p:cNvPicPr>
+            <p:nvPr/>
+          </p:nvPicPr>
+          <p:blipFill>
+            <a:blip r:embed="rId3"/>
+            <a:stretch>
+              <a:fillRect/>
+            </a:stretch>
+          </p:blipFill>
+          <p:spPr>
+            <a:xfrm>
+              <a:off x="9042129" y="3704550"/>
+              <a:ext cx="518160" cy="820904"/>
+            </a:xfrm>
+            <a:prstGeom prst="rect">
+              <a:avLst/>
+            </a:prstGeom>
+          </p:spPr>
+        </p:pic>
+      </p:grpSp>
+      <p:pic>
+        <p:nvPicPr>
+          <p:cNvPr id="36" name="Picture 35"/>
+          <p:cNvPicPr>
+            <a:picLocks noChangeAspect="1"/>
+          </p:cNvPicPr>
+          <p:nvPr/>
+        </p:nvPicPr>
+        <p:blipFill>
+          <a:blip r:embed="rId4"/>
+          <a:stretch>
+            <a:fillRect/>
+          </a:stretch>
+        </p:blipFill>
+        <p:spPr>
+          <a:xfrm>
+            <a:off x="3959532" y="3140948"/>
+            <a:ext cx="560474" cy="532450"/>
+          </a:xfrm>
+          <a:prstGeom prst="rect">
+            <a:avLst/>
+          </a:prstGeom>
+        </p:spPr>
+      </p:pic>
+      <p:grpSp>
+        <p:nvGrpSpPr>
+          <p:cNvPr id="42" name="Group 41"/>
+          <p:cNvGrpSpPr/>
+          <p:nvPr/>
+        </p:nvGrpSpPr>
+        <p:grpSpPr>
+          <a:xfrm>
+            <a:off x="314034" y="3373978"/>
+            <a:ext cx="2961022" cy="1841539"/>
+            <a:chOff x="359245" y="2411433"/>
+            <a:chExt cx="2961022" cy="1841539"/>
+          </a:xfrm>
+        </p:grpSpPr>
+        <p:grpSp>
+          <p:nvGrpSpPr>
+            <p:cNvPr id="34" name="Group 33"/>
+            <p:cNvGrpSpPr/>
+            <p:nvPr/>
+          </p:nvGrpSpPr>
+          <p:grpSpPr>
+            <a:xfrm>
+              <a:off x="359245" y="3660388"/>
+              <a:ext cx="2961022" cy="592584"/>
+              <a:chOff x="189374" y="3932870"/>
+              <a:chExt cx="2961022" cy="592584"/>
+            </a:xfrm>
+          </p:grpSpPr>
+          <p:sp>
+            <p:nvSpPr>
+              <p:cNvPr id="5" name="Rectangle 4"/>
+              <p:cNvSpPr/>
+              <p:nvPr/>
+            </p:nvSpPr>
+            <p:spPr>
+              <a:xfrm>
+                <a:off x="189374" y="3932870"/>
+                <a:ext cx="1253346" cy="592584"/>
+              </a:xfrm>
+              <a:prstGeom prst="rect">
+                <a:avLst/>
+              </a:prstGeom>
+              <a:noFill/>
+              <a:ln w="25400">
+                <a:solidFill>
+                  <a:schemeClr val="tx1"/>
+                </a:solidFill>
+              </a:ln>
+              <a:effectLst/>
+            </p:spPr>
+            <p:style>
+              <a:lnRef idx="1">
+                <a:schemeClr val="accent1"/>
+              </a:lnRef>
+              <a:fillRef idx="3">
+                <a:schemeClr val="accent1"/>
+              </a:fillRef>
+              <a:effectRef idx="2">
+                <a:schemeClr val="accent1"/>
+              </a:effectRef>
+              <a:fontRef idx="minor">
+                <a:schemeClr val="lt1"/>
+              </a:fontRef>
+            </p:style>
+            <p:txBody>
+              <a:bodyPr rtlCol="0" anchor="ctr"/>
+              <a:lstStyle/>
+              <a:p>
+                <a:pPr algn="ctr"/>
+                <a:r>
+                  <a:rPr lang="en-US" dirty="0" smtClean="0">
+                    <a:solidFill>
+                      <a:schemeClr val="tx1"/>
+                    </a:solidFill>
+                  </a:rPr>
+                  <a:t>Webserver</a:t>
+                </a:r>
+                <a:endParaRPr lang="en-US" dirty="0">
+                  <a:solidFill>
+                    <a:schemeClr val="tx1"/>
+                  </a:solidFill>
+                </a:endParaRPr>
+              </a:p>
+            </p:txBody>
+          </p:sp>
+          <p:cxnSp>
+            <p:nvCxnSpPr>
+              <p:cNvPr id="11" name="Straight Arrow Connector 10"/>
+              <p:cNvCxnSpPr>
+                <a:stCxn id="5" idx="3"/>
+                <a:endCxn id="22" idx="1"/>
+              </p:cNvCxnSpPr>
+              <p:nvPr/>
+            </p:nvCxnSpPr>
+            <p:spPr>
+              <a:xfrm>
+                <a:off x="1442720" y="4229162"/>
+                <a:ext cx="397036" cy="0"/>
+              </a:xfrm>
+              <a:prstGeom prst="straightConnector1">
+                <a:avLst/>
+              </a:prstGeom>
+              <a:ln>
+                <a:solidFill>
+                  <a:schemeClr val="tx1"/>
+                </a:solidFill>
+                <a:headEnd type="arrow"/>
+                <a:tailEnd type="arrow"/>
+              </a:ln>
+              <a:effectLst/>
+            </p:spPr>
+            <p:style>
+              <a:lnRef idx="2">
+                <a:schemeClr val="accent1"/>
+              </a:lnRef>
+              <a:fillRef idx="0">
+                <a:schemeClr val="accent1"/>
+              </a:fillRef>
+              <a:effectRef idx="1">
+                <a:schemeClr val="accent1"/>
+              </a:effectRef>
+              <a:fontRef idx="minor">
+                <a:schemeClr val="tx1"/>
+              </a:fontRef>
+            </p:style>
+          </p:cxnSp>
+          <p:sp>
+            <p:nvSpPr>
+              <p:cNvPr id="22" name="Rounded Rectangle 21"/>
+              <p:cNvSpPr/>
+              <p:nvPr/>
+            </p:nvSpPr>
+            <p:spPr>
+              <a:xfrm>
+                <a:off x="1839756" y="3932870"/>
+                <a:ext cx="1310640" cy="592584"/>
+              </a:xfrm>
+              <a:prstGeom prst="roundRect">
+                <a:avLst/>
+              </a:prstGeom>
+              <a:noFill/>
+              <a:ln>
+                <a:solidFill>
+                  <a:schemeClr val="tx1"/>
+                </a:solidFill>
+              </a:ln>
+              <a:effectLst/>
+            </p:spPr>
+            <p:style>
+              <a:lnRef idx="1">
+                <a:schemeClr val="accent1"/>
+              </a:lnRef>
+              <a:fillRef idx="3">
+                <a:schemeClr val="accent1"/>
+              </a:fillRef>
+              <a:effectRef idx="2">
+                <a:schemeClr val="accent1"/>
+              </a:effectRef>
+              <a:fontRef idx="minor">
+                <a:schemeClr val="lt1"/>
+              </a:fontRef>
+            </p:style>
+            <p:txBody>
+              <a:bodyPr rtlCol="0" anchor="ctr"/>
+              <a:lstStyle/>
+              <a:p>
+                <a:pPr algn="ctr"/>
+                <a:r>
+                  <a:rPr lang="en-US" dirty="0" smtClean="0">
+                    <a:solidFill>
+                      <a:srgbClr val="000000"/>
+                    </a:solidFill>
+                  </a:rPr>
+                  <a:t>Backend-Server</a:t>
+                </a:r>
+                <a:endParaRPr lang="en-US" dirty="0">
+                  <a:solidFill>
+                    <a:srgbClr val="000000"/>
+                  </a:solidFill>
+                </a:endParaRPr>
+              </a:p>
+            </p:txBody>
+          </p:sp>
+        </p:grpSp>
+        <p:pic>
+          <p:nvPicPr>
+            <p:cNvPr id="35" name="Picture 34"/>
+            <p:cNvPicPr>
+              <a:picLocks noChangeAspect="1"/>
+            </p:cNvPicPr>
+            <p:nvPr/>
+          </p:nvPicPr>
+          <p:blipFill>
+            <a:blip r:embed="rId4"/>
+            <a:stretch>
+              <a:fillRect/>
+            </a:stretch>
+          </p:blipFill>
+          <p:spPr>
+            <a:xfrm>
+              <a:off x="359245" y="2686630"/>
+              <a:ext cx="560474" cy="532450"/>
+            </a:xfrm>
+            <a:prstGeom prst="rect">
+              <a:avLst/>
+            </a:prstGeom>
+          </p:spPr>
+        </p:pic>
+        <p:sp>
+          <p:nvSpPr>
+            <p:cNvPr id="39" name="TextBox 38"/>
+            <p:cNvSpPr txBox="1"/>
+            <p:nvPr/>
+          </p:nvSpPr>
+          <p:spPr>
+            <a:xfrm>
+              <a:off x="1082277" y="2411433"/>
+              <a:ext cx="2237989" cy="1169551"/>
+            </a:xfrm>
+            <a:prstGeom prst="rect">
+              <a:avLst/>
+            </a:prstGeom>
+            <a:noFill/>
+          </p:spPr>
+          <p:txBody>
+            <a:bodyPr wrap="square" numCol="1" rtlCol="0">
+              <a:spAutoFit/>
+            </a:bodyPr>
+            <a:lstStyle/>
+            <a:p>
+              <a:pPr marL="342900" indent="-342900">
+                <a:buAutoNum type="arabicPeriod"/>
+              </a:pPr>
+              <a:r>
+                <a:rPr lang="en-US" sz="1400" dirty="0" smtClean="0"/>
+                <a:t>User Input </a:t>
+              </a:r>
+            </a:p>
+            <a:p>
+              <a:pPr marL="342900" indent="-342900">
+                <a:buAutoNum type="arabicPeriod"/>
+              </a:pPr>
+              <a:r>
+                <a:rPr lang="en-US" sz="1400" dirty="0" smtClean="0"/>
+                <a:t>Bug Symptoms?</a:t>
+              </a:r>
+              <a:endParaRPr lang="en-US" sz="1400" dirty="0"/>
+            </a:p>
+            <a:p>
+              <a:pPr marL="342900" indent="-342900">
+                <a:buAutoNum type="arabicPeriod"/>
+              </a:pPr>
+              <a:r>
+                <a:rPr lang="en-US" sz="1400" dirty="0" smtClean="0"/>
+                <a:t>Configuration?</a:t>
+              </a:r>
+            </a:p>
+            <a:p>
+              <a:pPr marL="342900" indent="-342900">
+                <a:buAutoNum type="arabicPeriod"/>
+              </a:pPr>
+              <a:r>
+                <a:rPr lang="en-US" sz="1400" dirty="0" smtClean="0"/>
+                <a:t>System State</a:t>
+              </a:r>
+            </a:p>
+            <a:p>
+              <a:pPr marL="342900" indent="-342900">
+                <a:buAutoNum type="arabicPeriod"/>
+              </a:pPr>
+              <a:r>
+                <a:rPr lang="en-US" sz="1400" dirty="0" smtClean="0"/>
+                <a:t>Scale?</a:t>
+              </a:r>
+              <a:endParaRPr lang="en-US" sz="1400" dirty="0"/>
+            </a:p>
+          </p:txBody>
+        </p:sp>
+      </p:grpSp>
+      <p:sp>
+        <p:nvSpPr>
+          <p:cNvPr id="43" name="TextBox 42"/>
+          <p:cNvSpPr txBox="1"/>
+          <p:nvPr/>
+        </p:nvSpPr>
+        <p:spPr>
+          <a:xfrm>
+            <a:off x="4765786" y="3087737"/>
+            <a:ext cx="2237989" cy="738664"/>
+          </a:xfrm>
+          <a:prstGeom prst="rect">
+            <a:avLst/>
+          </a:prstGeom>
+          <a:noFill/>
+        </p:spPr>
+        <p:txBody>
+          <a:bodyPr wrap="square" numCol="1" rtlCol="0">
+            <a:spAutoFit/>
+          </a:bodyPr>
+          <a:lstStyle/>
+          <a:p>
+            <a:pPr marL="342900" indent="-342900">
+              <a:buAutoNum type="arabicPeriod"/>
+            </a:pPr>
+            <a:r>
+              <a:rPr lang="en-US" sz="1400" dirty="0" smtClean="0"/>
+              <a:t>Live Debugging</a:t>
+            </a:r>
+          </a:p>
+          <a:p>
+            <a:pPr marL="342900" indent="-342900">
+              <a:buAutoNum type="arabicPeriod"/>
+            </a:pPr>
+            <a:r>
+              <a:rPr lang="en-US" sz="1400" dirty="0" smtClean="0"/>
+              <a:t>Same system state</a:t>
+            </a:r>
+          </a:p>
+          <a:p>
+            <a:pPr marL="342900" indent="-342900">
+              <a:buAutoNum type="arabicPeriod"/>
+            </a:pPr>
+            <a:r>
+              <a:rPr lang="en-US" sz="1400" dirty="0" smtClean="0"/>
+              <a:t>User input available</a:t>
+            </a:r>
+            <a:endParaRPr lang="en-US" sz="1400" dirty="0"/>
+          </a:p>
+        </p:txBody>
+      </p:sp>
+      <p:pic>
+        <p:nvPicPr>
+          <p:cNvPr id="44" name="Picture 43"/>
+          <p:cNvPicPr>
+            <a:picLocks noChangeAspect="1"/>
+          </p:cNvPicPr>
+          <p:nvPr/>
+        </p:nvPicPr>
+        <p:blipFill>
+          <a:blip r:embed="rId5"/>
+          <a:stretch>
+            <a:fillRect/>
+          </a:stretch>
+        </p:blipFill>
+        <p:spPr>
+          <a:xfrm>
+            <a:off x="6788631" y="3087737"/>
+            <a:ext cx="505460" cy="505460"/>
+          </a:xfrm>
+          <a:prstGeom prst="rect">
+            <a:avLst/>
+          </a:prstGeom>
+        </p:spPr>
+      </p:pic>
+      <p:pic>
+        <p:nvPicPr>
+          <p:cNvPr id="45" name="Picture 44"/>
+          <p:cNvPicPr>
+            <a:picLocks noChangeAspect="1"/>
+          </p:cNvPicPr>
+          <p:nvPr/>
+        </p:nvPicPr>
+        <p:blipFill>
+          <a:blip r:embed="rId6"/>
+          <a:stretch>
+            <a:fillRect/>
+          </a:stretch>
+        </p:blipFill>
+        <p:spPr>
+          <a:xfrm>
+            <a:off x="2710689" y="3714905"/>
+            <a:ext cx="360929" cy="429260"/>
+          </a:xfrm>
+          <a:prstGeom prst="rect">
+            <a:avLst/>
+          </a:prstGeom>
+        </p:spPr>
+      </p:pic>
+      <p:sp>
+        <p:nvSpPr>
+          <p:cNvPr id="46" name="TextBox 45"/>
+          <p:cNvSpPr txBox="1"/>
+          <p:nvPr/>
+        </p:nvSpPr>
+        <p:spPr>
+          <a:xfrm>
+            <a:off x="178309" y="5540588"/>
+            <a:ext cx="3210560" cy="307777"/>
+          </a:xfrm>
+          <a:prstGeom prst="rect">
+            <a:avLst/>
+          </a:prstGeom>
+          <a:noFill/>
+        </p:spPr>
+        <p:txBody>
+          <a:bodyPr wrap="square" rtlCol="0">
+            <a:spAutoFit/>
+          </a:bodyPr>
+          <a:lstStyle/>
+          <a:p>
+            <a:pPr algn="ctr"/>
+            <a:r>
+              <a:rPr lang="en-US" sz="1400" dirty="0" smtClean="0"/>
+              <a:t>(</a:t>
+            </a:r>
+            <a:r>
+              <a:rPr lang="en-US" sz="1400" dirty="0" err="1" smtClean="0"/>
+              <a:t>i</a:t>
+            </a:r>
+            <a:r>
+              <a:rPr lang="en-US" sz="1400" dirty="0" smtClean="0"/>
+              <a:t>). Without </a:t>
+            </a:r>
+            <a:r>
+              <a:rPr lang="en-US" sz="1400" dirty="0" err="1" smtClean="0"/>
+              <a:t>Parikshan</a:t>
+            </a:r>
+            <a:r>
+              <a:rPr lang="en-US" sz="1400" dirty="0"/>
+              <a:t> </a:t>
+            </a:r>
+            <a:r>
+              <a:rPr lang="en-US" sz="1400" dirty="0" smtClean="0"/>
+              <a:t>- Offline Testing</a:t>
+            </a:r>
+            <a:endParaRPr lang="en-US" sz="1400" dirty="0"/>
+          </a:p>
+        </p:txBody>
+      </p:sp>
+      <p:sp>
+        <p:nvSpPr>
+          <p:cNvPr id="47" name="TextBox 46"/>
+          <p:cNvSpPr txBox="1"/>
+          <p:nvPr/>
+        </p:nvSpPr>
+        <p:spPr>
+          <a:xfrm>
+            <a:off x="4416132" y="5540588"/>
+            <a:ext cx="3210560" cy="307777"/>
+          </a:xfrm>
+          <a:prstGeom prst="rect">
+            <a:avLst/>
+          </a:prstGeom>
+          <a:noFill/>
+        </p:spPr>
+        <p:txBody>
+          <a:bodyPr wrap="square" rtlCol="0">
+            <a:spAutoFit/>
+          </a:bodyPr>
+          <a:lstStyle/>
+          <a:p>
+            <a:pPr algn="ctr"/>
+            <a:r>
+              <a:rPr lang="en-US" sz="1400" dirty="0" smtClean="0"/>
+              <a:t>(ii). With </a:t>
+            </a:r>
+            <a:r>
+              <a:rPr lang="en-US" sz="1400" dirty="0" err="1" smtClean="0"/>
+              <a:t>Parikshan</a:t>
+            </a:r>
+            <a:r>
+              <a:rPr lang="en-US" sz="1400" dirty="0" smtClean="0"/>
+              <a:t> - Online Testing</a:t>
+            </a:r>
+            <a:endParaRPr lang="en-US" sz="1400" dirty="0"/>
+          </a:p>
+        </p:txBody>
+      </p:sp>
+      <p:cxnSp>
+        <p:nvCxnSpPr>
+          <p:cNvPr id="49" name="Straight Connector 48"/>
+          <p:cNvCxnSpPr/>
+          <p:nvPr/>
+        </p:nvCxnSpPr>
+        <p:spPr>
+          <a:xfrm>
+            <a:off x="3571749" y="2912125"/>
+            <a:ext cx="0" cy="2936240"/>
+          </a:xfrm>
+          <a:prstGeom prst="line">
+            <a:avLst/>
+          </a:prstGeom>
+          <a:ln>
+            <a:solidFill>
+              <a:schemeClr val="tx1"/>
+            </a:solidFill>
+          </a:ln>
+          <a:effectLst/>
+        </p:spPr>
+        <p:style>
+          <a:lnRef idx="2">
+            <a:schemeClr val="accent1"/>
+          </a:lnRef>
+          <a:fillRef idx="0">
+            <a:schemeClr val="accent1"/>
+          </a:fillRef>
+          <a:effectRef idx="1">
+            <a:schemeClr val="accent1"/>
+          </a:effectRef>
+          <a:fontRef idx="minor">
+            <a:schemeClr val="tx1"/>
+          </a:fontRef>
+        </p:style>
+      </p:cxnSp>
+      <p:sp>
+        <p:nvSpPr>
+          <p:cNvPr id="52" name="TextBox 51"/>
+          <p:cNvSpPr txBox="1"/>
+          <p:nvPr/>
+        </p:nvSpPr>
+        <p:spPr>
+          <a:xfrm>
+            <a:off x="7247615" y="5154557"/>
+            <a:ext cx="1757789" cy="276999"/>
+          </a:xfrm>
+          <a:prstGeom prst="rect">
+            <a:avLst/>
+          </a:prstGeom>
+          <a:noFill/>
+        </p:spPr>
+        <p:txBody>
+          <a:bodyPr wrap="square" rtlCol="0">
+            <a:spAutoFit/>
+          </a:bodyPr>
+          <a:lstStyle/>
+          <a:p>
+            <a:r>
+              <a:rPr lang="en-US" sz="1200" dirty="0" smtClean="0"/>
+              <a:t>View traces/test-cases</a:t>
+            </a:r>
+            <a:endParaRPr lang="en-US" sz="1200" dirty="0"/>
+          </a:p>
+        </p:txBody>
+      </p:sp>
+    </p:spTree>
+    <p:extLst>
+      <p:ext uri="{BB962C8B-B14F-4D97-AF65-F5344CB8AC3E}">
+        <p14:creationId xmlns:p14="http://schemas.microsoft.com/office/powerpoint/2010/main" val="3442495006"/>
       </p:ext>
     </p:extLst>
   </p:cSld>

</xml_diff>

<commit_message>
adding vzclone_vz48, and updates to the paper
</commit_message>
<xml_diff>
--- a/paper/figs/images.pptx
+++ b/paper/figs/images.pptx
@@ -296,7 +296,7 @@
           <a:p>
             <a:fld id="{06D27FD6-7394-0F44-B86B-46BBC2D874F2}" type="datetimeFigureOut">
               <a:rPr lang="en-US" smtClean="0"/>
-              <a:t>11/17/14</a:t>
+              <a:t>12/7/14</a:t>
             </a:fld>
             <a:endParaRPr lang="en-US"/>
           </a:p>
@@ -466,7 +466,7 @@
           <a:p>
             <a:fld id="{06D27FD6-7394-0F44-B86B-46BBC2D874F2}" type="datetimeFigureOut">
               <a:rPr lang="en-US" smtClean="0"/>
-              <a:t>11/17/14</a:t>
+              <a:t>12/7/14</a:t>
             </a:fld>
             <a:endParaRPr lang="en-US"/>
           </a:p>
@@ -646,7 +646,7 @@
           <a:p>
             <a:fld id="{06D27FD6-7394-0F44-B86B-46BBC2D874F2}" type="datetimeFigureOut">
               <a:rPr lang="en-US" smtClean="0"/>
-              <a:t>11/17/14</a:t>
+              <a:t>12/7/14</a:t>
             </a:fld>
             <a:endParaRPr lang="en-US"/>
           </a:p>
@@ -816,7 +816,7 @@
           <a:p>
             <a:fld id="{06D27FD6-7394-0F44-B86B-46BBC2D874F2}" type="datetimeFigureOut">
               <a:rPr lang="en-US" smtClean="0"/>
-              <a:t>11/17/14</a:t>
+              <a:t>12/7/14</a:t>
             </a:fld>
             <a:endParaRPr lang="en-US"/>
           </a:p>
@@ -1062,7 +1062,7 @@
           <a:p>
             <a:fld id="{06D27FD6-7394-0F44-B86B-46BBC2D874F2}" type="datetimeFigureOut">
               <a:rPr lang="en-US" smtClean="0"/>
-              <a:t>11/17/14</a:t>
+              <a:t>12/7/14</a:t>
             </a:fld>
             <a:endParaRPr lang="en-US"/>
           </a:p>
@@ -1350,7 +1350,7 @@
           <a:p>
             <a:fld id="{06D27FD6-7394-0F44-B86B-46BBC2D874F2}" type="datetimeFigureOut">
               <a:rPr lang="en-US" smtClean="0"/>
-              <a:t>11/17/14</a:t>
+              <a:t>12/7/14</a:t>
             </a:fld>
             <a:endParaRPr lang="en-US"/>
           </a:p>
@@ -1772,7 +1772,7 @@
           <a:p>
             <a:fld id="{06D27FD6-7394-0F44-B86B-46BBC2D874F2}" type="datetimeFigureOut">
               <a:rPr lang="en-US" smtClean="0"/>
-              <a:t>11/17/14</a:t>
+              <a:t>12/7/14</a:t>
             </a:fld>
             <a:endParaRPr lang="en-US"/>
           </a:p>
@@ -1890,7 +1890,7 @@
           <a:p>
             <a:fld id="{06D27FD6-7394-0F44-B86B-46BBC2D874F2}" type="datetimeFigureOut">
               <a:rPr lang="en-US" smtClean="0"/>
-              <a:t>11/17/14</a:t>
+              <a:t>12/7/14</a:t>
             </a:fld>
             <a:endParaRPr lang="en-US"/>
           </a:p>
@@ -1985,7 +1985,7 @@
           <a:p>
             <a:fld id="{06D27FD6-7394-0F44-B86B-46BBC2D874F2}" type="datetimeFigureOut">
               <a:rPr lang="en-US" smtClean="0"/>
-              <a:t>11/17/14</a:t>
+              <a:t>12/7/14</a:t>
             </a:fld>
             <a:endParaRPr lang="en-US"/>
           </a:p>
@@ -2262,7 +2262,7 @@
           <a:p>
             <a:fld id="{06D27FD6-7394-0F44-B86B-46BBC2D874F2}" type="datetimeFigureOut">
               <a:rPr lang="en-US" smtClean="0"/>
-              <a:t>11/17/14</a:t>
+              <a:t>12/7/14</a:t>
             </a:fld>
             <a:endParaRPr lang="en-US"/>
           </a:p>
@@ -2515,7 +2515,7 @@
           <a:p>
             <a:fld id="{06D27FD6-7394-0F44-B86B-46BBC2D874F2}" type="datetimeFigureOut">
               <a:rPr lang="en-US" smtClean="0"/>
-              <a:t>11/17/14</a:t>
+              <a:t>12/7/14</a:t>
             </a:fld>
             <a:endParaRPr lang="en-US"/>
           </a:p>
@@ -2728,7 +2728,7 @@
           <a:p>
             <a:fld id="{06D27FD6-7394-0F44-B86B-46BBC2D874F2}" type="datetimeFigureOut">
               <a:rPr lang="en-US" smtClean="0"/>
-              <a:t>11/17/14</a:t>
+              <a:t>12/7/14</a:t>
             </a:fld>
             <a:endParaRPr lang="en-US"/>
           </a:p>
@@ -11030,6 +11030,17 @@
                 </a:rPr>
                 <a:t>Proxy</a:t>
               </a:r>
+            </a:p>
+            <a:p>
+              <a:pPr algn="ctr"/>
+              <a:r>
+                <a:rPr lang="en-US" dirty="0" err="1" smtClean="0">
+                  <a:solidFill>
+                    <a:schemeClr val="tx1"/>
+                  </a:solidFill>
+                </a:rPr>
+                <a:t>Aggergator</a:t>
+              </a:r>
               <a:endParaRPr lang="en-US" dirty="0">
                 <a:solidFill>
                   <a:schemeClr val="tx1"/>
@@ -11344,13 +11355,18 @@
             <a:p>
               <a:pPr algn="ctr"/>
               <a:r>
-                <a:rPr lang="en-US" sz="1200" dirty="0" smtClean="0">
+                <a:rPr lang="en-US" sz="1200" dirty="0">
                   <a:solidFill>
                     <a:srgbClr val="000000"/>
                   </a:solidFill>
                 </a:rPr>
-                <a:t>3</a:t>
+                <a:t>1</a:t>
               </a:r>
+              <a:endParaRPr lang="en-US" sz="1200" dirty="0" smtClean="0">
+                <a:solidFill>
+                  <a:srgbClr val="000000"/>
+                </a:solidFill>
+              </a:endParaRPr>
             </a:p>
           </p:txBody>
         </p:sp>
@@ -11401,7 +11417,7 @@
                     <a:srgbClr val="000000"/>
                   </a:solidFill>
                 </a:rPr>
-                <a:t>4</a:t>
+                <a:t>2</a:t>
               </a:r>
               <a:endParaRPr lang="en-US" sz="1200" dirty="0" smtClean="0">
                 <a:solidFill>
@@ -11678,6 +11694,115 @@
           </a:fontRef>
         </p:style>
       </p:cxnSp>
+      <p:sp>
+        <p:nvSpPr>
+          <p:cNvPr id="18" name="Oval 17"/>
+          <p:cNvSpPr/>
+          <p:nvPr/>
+        </p:nvSpPr>
+        <p:spPr>
+          <a:xfrm>
+            <a:off x="4098913" y="2813849"/>
+            <a:ext cx="745393" cy="396689"/>
+          </a:xfrm>
+          <a:prstGeom prst="ellipse">
+            <a:avLst/>
+          </a:prstGeom>
+          <a:noFill/>
+          <a:ln w="12700">
+            <a:solidFill>
+              <a:schemeClr val="tx1"/>
+            </a:solidFill>
+          </a:ln>
+          <a:effectLst/>
+        </p:spPr>
+        <p:style>
+          <a:lnRef idx="1">
+            <a:schemeClr val="accent1"/>
+          </a:lnRef>
+          <a:fillRef idx="3">
+            <a:schemeClr val="accent1"/>
+          </a:fillRef>
+          <a:effectRef idx="2">
+            <a:schemeClr val="accent1"/>
+          </a:effectRef>
+          <a:fontRef idx="minor">
+            <a:schemeClr val="lt1"/>
+          </a:fontRef>
+        </p:style>
+        <p:txBody>
+          <a:bodyPr rtlCol="0" anchor="ctr"/>
+          <a:lstStyle/>
+          <a:p>
+            <a:pPr algn="ctr"/>
+            <a:r>
+              <a:rPr lang="en-US" sz="1200" dirty="0" smtClean="0">
+                <a:solidFill>
+                  <a:srgbClr val="000000"/>
+                </a:solidFill>
+              </a:rPr>
+              <a:t>3</a:t>
+            </a:r>
+          </a:p>
+        </p:txBody>
+      </p:sp>
+      <p:sp>
+        <p:nvSpPr>
+          <p:cNvPr id="22" name="Oval 21"/>
+          <p:cNvSpPr/>
+          <p:nvPr/>
+        </p:nvSpPr>
+        <p:spPr>
+          <a:xfrm>
+            <a:off x="4098913" y="3774866"/>
+            <a:ext cx="745393" cy="396689"/>
+          </a:xfrm>
+          <a:prstGeom prst="ellipse">
+            <a:avLst/>
+          </a:prstGeom>
+          <a:noFill/>
+          <a:ln w="12700">
+            <a:solidFill>
+              <a:schemeClr val="tx1"/>
+            </a:solidFill>
+          </a:ln>
+          <a:effectLst/>
+        </p:spPr>
+        <p:style>
+          <a:lnRef idx="1">
+            <a:schemeClr val="accent1"/>
+          </a:lnRef>
+          <a:fillRef idx="3">
+            <a:schemeClr val="accent1"/>
+          </a:fillRef>
+          <a:effectRef idx="2">
+            <a:schemeClr val="accent1"/>
+          </a:effectRef>
+          <a:fontRef idx="minor">
+            <a:schemeClr val="lt1"/>
+          </a:fontRef>
+        </p:style>
+        <p:txBody>
+          <a:bodyPr rtlCol="0" anchor="ctr"/>
+          <a:lstStyle/>
+          <a:p>
+            <a:pPr algn="ctr"/>
+            <a:r>
+              <a:rPr lang="en-US" sz="1200" dirty="0">
+                <a:solidFill>
+                  <a:srgbClr val="000000"/>
+                </a:solidFill>
+              </a:rPr>
+              <a:t>4</a:t>
+            </a:r>
+            <a:endParaRPr lang="en-US" sz="1200" dirty="0" smtClean="0">
+              <a:solidFill>
+                <a:srgbClr val="000000"/>
+              </a:solidFill>
+            </a:endParaRPr>
+          </a:p>
+        </p:txBody>
+      </p:sp>
     </p:spTree>
     <p:extLst>
       <p:ext uri="{BB962C8B-B14F-4D97-AF65-F5344CB8AC3E}">

</xml_diff>

<commit_message>
added some of Gail's feedback and a new aggregator figure
</commit_message>
<xml_diff>
--- a/paper/figs/images.pptx
+++ b/paper/figs/images.pptx
@@ -301,7 +301,7 @@
           <a:p>
             <a:fld id="{06D27FD6-7394-0F44-B86B-46BBC2D874F2}" type="datetimeFigureOut">
               <a:rPr lang="en-US" smtClean="0"/>
-              <a:t>12/30/14</a:t>
+              <a:t>1/26/15</a:t>
             </a:fld>
             <a:endParaRPr lang="en-US"/>
           </a:p>
@@ -471,7 +471,7 @@
           <a:p>
             <a:fld id="{06D27FD6-7394-0F44-B86B-46BBC2D874F2}" type="datetimeFigureOut">
               <a:rPr lang="en-US" smtClean="0"/>
-              <a:t>12/30/14</a:t>
+              <a:t>1/26/15</a:t>
             </a:fld>
             <a:endParaRPr lang="en-US"/>
           </a:p>
@@ -651,7 +651,7 @@
           <a:p>
             <a:fld id="{06D27FD6-7394-0F44-B86B-46BBC2D874F2}" type="datetimeFigureOut">
               <a:rPr lang="en-US" smtClean="0"/>
-              <a:t>12/30/14</a:t>
+              <a:t>1/26/15</a:t>
             </a:fld>
             <a:endParaRPr lang="en-US"/>
           </a:p>
@@ -821,7 +821,7 @@
           <a:p>
             <a:fld id="{06D27FD6-7394-0F44-B86B-46BBC2D874F2}" type="datetimeFigureOut">
               <a:rPr lang="en-US" smtClean="0"/>
-              <a:t>12/30/14</a:t>
+              <a:t>1/26/15</a:t>
             </a:fld>
             <a:endParaRPr lang="en-US"/>
           </a:p>
@@ -1067,7 +1067,7 @@
           <a:p>
             <a:fld id="{06D27FD6-7394-0F44-B86B-46BBC2D874F2}" type="datetimeFigureOut">
               <a:rPr lang="en-US" smtClean="0"/>
-              <a:t>12/30/14</a:t>
+              <a:t>1/26/15</a:t>
             </a:fld>
             <a:endParaRPr lang="en-US"/>
           </a:p>
@@ -1355,7 +1355,7 @@
           <a:p>
             <a:fld id="{06D27FD6-7394-0F44-B86B-46BBC2D874F2}" type="datetimeFigureOut">
               <a:rPr lang="en-US" smtClean="0"/>
-              <a:t>12/30/14</a:t>
+              <a:t>1/26/15</a:t>
             </a:fld>
             <a:endParaRPr lang="en-US"/>
           </a:p>
@@ -1777,7 +1777,7 @@
           <a:p>
             <a:fld id="{06D27FD6-7394-0F44-B86B-46BBC2D874F2}" type="datetimeFigureOut">
               <a:rPr lang="en-US" smtClean="0"/>
-              <a:t>12/30/14</a:t>
+              <a:t>1/26/15</a:t>
             </a:fld>
             <a:endParaRPr lang="en-US"/>
           </a:p>
@@ -1895,7 +1895,7 @@
           <a:p>
             <a:fld id="{06D27FD6-7394-0F44-B86B-46BBC2D874F2}" type="datetimeFigureOut">
               <a:rPr lang="en-US" smtClean="0"/>
-              <a:t>12/30/14</a:t>
+              <a:t>1/26/15</a:t>
             </a:fld>
             <a:endParaRPr lang="en-US"/>
           </a:p>
@@ -1990,7 +1990,7 @@
           <a:p>
             <a:fld id="{06D27FD6-7394-0F44-B86B-46BBC2D874F2}" type="datetimeFigureOut">
               <a:rPr lang="en-US" smtClean="0"/>
-              <a:t>12/30/14</a:t>
+              <a:t>1/26/15</a:t>
             </a:fld>
             <a:endParaRPr lang="en-US"/>
           </a:p>
@@ -2267,7 +2267,7 @@
           <a:p>
             <a:fld id="{06D27FD6-7394-0F44-B86B-46BBC2D874F2}" type="datetimeFigureOut">
               <a:rPr lang="en-US" smtClean="0"/>
-              <a:t>12/30/14</a:t>
+              <a:t>1/26/15</a:t>
             </a:fld>
             <a:endParaRPr lang="en-US"/>
           </a:p>
@@ -2520,7 +2520,7 @@
           <a:p>
             <a:fld id="{06D27FD6-7394-0F44-B86B-46BBC2D874F2}" type="datetimeFigureOut">
               <a:rPr lang="en-US" smtClean="0"/>
-              <a:t>12/30/14</a:t>
+              <a:t>1/26/15</a:t>
             </a:fld>
             <a:endParaRPr lang="en-US"/>
           </a:p>
@@ -2733,7 +2733,7 @@
           <a:p>
             <a:fld id="{06D27FD6-7394-0F44-B86B-46BBC2D874F2}" type="datetimeFigureOut">
               <a:rPr lang="en-US" smtClean="0"/>
-              <a:t>12/30/14</a:t>
+              <a:t>1/26/15</a:t>
             </a:fld>
             <a:endParaRPr lang="en-US"/>
           </a:p>
@@ -3372,7 +3372,6 @@
                 <a:rPr lang="en-US" sz="1800" i="1" dirty="0"/>
                 <a:t>Webserver</a:t>
               </a:r>
-              <a:endParaRPr lang="en-US" sz="1800" i="1" dirty="0"/>
             </a:p>
           </p:txBody>
         </p:sp>
@@ -3531,7 +3530,6 @@
                 <a:rPr lang="en-US" sz="1800" i="1" dirty="0"/>
                 <a:t>Server</a:t>
               </a:r>
-              <a:endParaRPr lang="en-US" sz="1800" i="1" dirty="0"/>
             </a:p>
           </p:txBody>
         </p:sp>
@@ -3708,7 +3706,6 @@
                 <a:rPr lang="en-US" sz="1800" i="1" dirty="0"/>
                 <a:t>Webserver</a:t>
               </a:r>
-              <a:endParaRPr lang="en-US" sz="1800" i="1" dirty="0"/>
             </a:p>
           </p:txBody>
         </p:sp>
@@ -3867,7 +3864,6 @@
                 <a:rPr lang="en-US" sz="1800" dirty="0"/>
                 <a:t>Duplicator</a:t>
               </a:r>
-              <a:endParaRPr lang="en-US" sz="1800" dirty="0"/>
             </a:p>
           </p:txBody>
         </p:sp>
@@ -4074,7 +4070,6 @@
                 <a:rPr lang="en-US" sz="1800" dirty="0"/>
                 <a:t>Process</a:t>
               </a:r>
-              <a:endParaRPr lang="en-US" sz="1800" dirty="0"/>
             </a:p>
           </p:txBody>
         </p:sp>
@@ -4195,7 +4190,6 @@
                 <a:rPr lang="en-US" sz="1700" i="1" dirty="0"/>
                 <a:t>Container</a:t>
               </a:r>
-              <a:endParaRPr lang="en-US" sz="1700" i="1" dirty="0"/>
             </a:p>
           </p:txBody>
         </p:sp>
@@ -4233,7 +4227,6 @@
                 <a:rPr lang="en-US" sz="1700" i="1" dirty="0"/>
                 <a:t>Container</a:t>
               </a:r>
-              <a:endParaRPr lang="en-US" sz="1700" i="1" dirty="0"/>
             </a:p>
           </p:txBody>
         </p:sp>
@@ -4315,7 +4308,6 @@
                 <a:rPr lang="en-US" sz="1800" i="1" dirty="0"/>
                 <a:t>Clone Manager</a:t>
               </a:r>
-              <a:endParaRPr lang="en-US" sz="1800" i="1" dirty="0"/>
             </a:p>
           </p:txBody>
         </p:sp>
@@ -4351,11 +4343,6 @@
               </a:rPr>
               <a:t>Request</a:t>
             </a:r>
-            <a:endParaRPr lang="en-US" sz="1800" i="1" dirty="0">
-              <a:solidFill>
-                <a:srgbClr val="FF0000"/>
-              </a:solidFill>
-            </a:endParaRPr>
           </a:p>
         </p:txBody>
       </p:sp>
@@ -4386,7 +4373,6 @@
               <a:rPr lang="en-US" sz="1800" i="1" dirty="0"/>
               <a:t>Request+ Response</a:t>
             </a:r>
-            <a:endParaRPr lang="en-US" sz="1800" i="1" dirty="0"/>
           </a:p>
         </p:txBody>
       </p:sp>
@@ -7028,7 +7014,6 @@
                 <a:rPr lang="en-US" sz="2100" dirty="0"/>
                 <a:t>Bug Symptoms?</a:t>
               </a:r>
-              <a:endParaRPr lang="en-US" sz="2100" dirty="0"/>
             </a:p>
             <a:p>
               <a:pPr marL="516899" indent="-516899">
@@ -7056,7 +7041,6 @@
                 <a:rPr lang="en-US" sz="2100" dirty="0"/>
                 <a:t>Scale?</a:t>
               </a:r>
-              <a:endParaRPr lang="en-US" sz="2100" dirty="0"/>
             </a:p>
           </p:txBody>
         </p:sp>
@@ -7108,7 +7092,6 @@
               <a:rPr lang="en-US" sz="2100" dirty="0"/>
               <a:t>User input available</a:t>
             </a:r>
-            <a:endParaRPr lang="en-US" sz="2100" dirty="0"/>
           </a:p>
         </p:txBody>
       </p:sp>
@@ -7201,13 +7184,8 @@
             </a:r>
             <a:r>
               <a:rPr lang="en-US" sz="2100" dirty="0"/>
-              <a:t> </a:t>
+              <a:t> - Offline Testing</a:t>
             </a:r>
-            <a:r>
-              <a:rPr lang="en-US" sz="2100" dirty="0"/>
-              <a:t>- Offline Testing</a:t>
-            </a:r>
-            <a:endParaRPr lang="en-US" sz="2100" dirty="0"/>
           </a:p>
         </p:txBody>
       </p:sp>
@@ -7246,7 +7224,6 @@
               <a:rPr lang="en-US" sz="2100" dirty="0"/>
               <a:t> - Online Testing</a:t>
             </a:r>
-            <a:endParaRPr lang="en-US" sz="2100" dirty="0"/>
           </a:p>
         </p:txBody>
       </p:sp>
@@ -7312,7 +7289,6 @@
               <a:rPr lang="en-US" sz="1800" dirty="0"/>
               <a:t>View traces/test-cases</a:t>
             </a:r>
-            <a:endParaRPr lang="en-US" sz="1800" dirty="0"/>
           </a:p>
         </p:txBody>
       </p:sp>
@@ -7355,9 +7331,9 @@
         <p:grpSpPr>
           <a:xfrm>
             <a:off x="185499" y="185046"/>
-            <a:ext cx="6254797" cy="4108947"/>
+            <a:ext cx="6764838" cy="4108947"/>
             <a:chOff x="2306969" y="2825246"/>
-            <a:chExt cx="6254797" cy="4108947"/>
+            <a:chExt cx="6764838" cy="4108947"/>
           </a:xfrm>
         </p:grpSpPr>
         <p:sp>
@@ -7375,7 +7351,7 @@
               <a:avLst/>
             </a:prstGeom>
             <a:noFill/>
-            <a:ln w="12700">
+            <a:ln w="25400">
               <a:solidFill>
                 <a:schemeClr val="tx1"/>
               </a:solidFill>
@@ -7402,14 +7378,14 @@
             <a:p>
               <a:pPr algn="ctr"/>
               <a:r>
-                <a:rPr lang="en-US" sz="3600" dirty="0">
+                <a:rPr lang="en-US" sz="4400" dirty="0">
                   <a:solidFill>
                     <a:schemeClr val="tx1"/>
                   </a:solidFill>
                 </a:rPr>
                 <a:t>Client</a:t>
               </a:r>
-              <a:endParaRPr lang="en-US" sz="2100" dirty="0">
+              <a:endParaRPr lang="en-US" sz="2800" dirty="0">
                 <a:solidFill>
                   <a:schemeClr val="tx1"/>
                 </a:solidFill>
@@ -7432,7 +7408,7 @@
               <a:avLst/>
             </a:prstGeom>
             <a:noFill/>
-            <a:ln w="12700">
+            <a:ln w="25400">
               <a:solidFill>
                 <a:schemeClr val="tx1"/>
               </a:solidFill>
@@ -7459,7 +7435,7 @@
             <a:p>
               <a:pPr algn="ctr"/>
               <a:r>
-                <a:rPr lang="en-US" sz="3600" dirty="0">
+                <a:rPr lang="en-US" sz="4400" dirty="0">
                   <a:solidFill>
                     <a:schemeClr val="tx1"/>
                   </a:solidFill>
@@ -7482,14 +7458,14 @@
           </p:nvSpPr>
           <p:spPr>
             <a:xfrm>
-              <a:off x="6307261" y="2825246"/>
-              <a:ext cx="2254505" cy="853736"/>
+              <a:off x="6130787" y="2825246"/>
+              <a:ext cx="2941020" cy="853736"/>
             </a:xfrm>
             <a:prstGeom prst="rect">
               <a:avLst/>
             </a:prstGeom>
             <a:noFill/>
-            <a:ln w="12700">
+            <a:ln w="25400">
               <a:solidFill>
                 <a:schemeClr val="tx1"/>
               </a:solidFill>
@@ -7516,7 +7492,7 @@
             <a:p>
               <a:pPr algn="ctr"/>
               <a:r>
-                <a:rPr lang="en-US" sz="3600" dirty="0">
+                <a:rPr lang="en-US" sz="4400" dirty="0">
                   <a:solidFill>
                     <a:schemeClr val="tx1"/>
                   </a:solidFill>
@@ -7546,7 +7522,7 @@
               <a:avLst/>
             </a:prstGeom>
             <a:noFill/>
-            <a:ln w="12700">
+            <a:ln w="25400">
               <a:solidFill>
                 <a:schemeClr val="tx1"/>
               </a:solidFill>
@@ -7573,7 +7549,7 @@
             <a:p>
               <a:pPr algn="ctr"/>
               <a:r>
-                <a:rPr lang="en-US" sz="3600" dirty="0">
+                <a:rPr lang="en-US" sz="4400" dirty="0">
                   <a:solidFill>
                     <a:schemeClr val="tx1"/>
                   </a:solidFill>
@@ -7602,7 +7578,7 @@
             <a:prstGeom prst="straightConnector1">
               <a:avLst/>
             </a:prstGeom>
-            <a:ln w="12700">
+            <a:ln w="25400">
               <a:solidFill>
                 <a:schemeClr val="tx1"/>
               </a:solidFill>
@@ -7639,7 +7615,7 @@
             <a:prstGeom prst="straightConnector1">
               <a:avLst/>
             </a:prstGeom>
-            <a:ln w="12700">
+            <a:ln w="25400">
               <a:solidFill>
                 <a:schemeClr val="tx1"/>
               </a:solidFill>
@@ -7676,7 +7652,7 @@
             <a:prstGeom prst="straightConnector1">
               <a:avLst/>
             </a:prstGeom>
-            <a:ln w="12700">
+            <a:ln w="25400">
               <a:solidFill>
                 <a:schemeClr val="tx1"/>
               </a:solidFill>
@@ -7713,7 +7689,7 @@
             <a:prstGeom prst="straightConnector1">
               <a:avLst/>
             </a:prstGeom>
-            <a:ln w="12700">
+            <a:ln w="25400">
               <a:solidFill>
                 <a:schemeClr val="tx1"/>
               </a:solidFill>
@@ -7750,7 +7726,7 @@
             <a:prstGeom prst="straightConnector1">
               <a:avLst/>
             </a:prstGeom>
-            <a:ln w="12700">
+            <a:ln w="25400">
               <a:solidFill>
                 <a:schemeClr val="tx1"/>
               </a:solidFill>
@@ -7787,7 +7763,7 @@
             <a:prstGeom prst="straightConnector1">
               <a:avLst/>
             </a:prstGeom>
-            <a:ln w="12700">
+            <a:ln w="25400">
               <a:solidFill>
                 <a:schemeClr val="tx1"/>
               </a:solidFill>
@@ -7818,14 +7794,14 @@
           </p:nvSpPr>
           <p:spPr>
             <a:xfrm>
-              <a:off x="5472178" y="3468375"/>
+              <a:off x="5332608" y="3524195"/>
               <a:ext cx="658609" cy="555362"/>
             </a:xfrm>
             <a:prstGeom prst="ellipse">
               <a:avLst/>
             </a:prstGeom>
             <a:noFill/>
-            <a:ln w="12700">
+            <a:ln w="25400">
               <a:solidFill>
                 <a:schemeClr val="tx1"/>
               </a:solidFill>
@@ -7877,7 +7853,7 @@
               <a:avLst/>
             </a:prstGeom>
             <a:noFill/>
-            <a:ln w="12700">
+            <a:ln w="25400">
               <a:solidFill>
                 <a:schemeClr val="tx1"/>
               </a:solidFill>
@@ -7911,11 +7887,6 @@
                 </a:rPr>
                 <a:t>4</a:t>
               </a:r>
-              <a:endParaRPr lang="en-US" sz="3200" dirty="0">
-                <a:solidFill>
-                  <a:srgbClr val="000000"/>
-                </a:solidFill>
-              </a:endParaRPr>
             </a:p>
           </p:txBody>
         </p:sp>
@@ -7934,7 +7905,7 @@
               <a:avLst/>
             </a:prstGeom>
             <a:noFill/>
-            <a:ln w="12700">
+            <a:ln w="25400">
               <a:solidFill>
                 <a:schemeClr val="tx1"/>
               </a:solidFill>
@@ -7968,11 +7939,6 @@
                 </a:rPr>
                 <a:t>1</a:t>
               </a:r>
-              <a:endParaRPr lang="en-US" sz="3200" dirty="0">
-                <a:solidFill>
-                  <a:srgbClr val="000000"/>
-                </a:solidFill>
-              </a:endParaRPr>
             </a:p>
           </p:txBody>
         </p:sp>
@@ -7991,7 +7957,7 @@
               <a:avLst/>
             </a:prstGeom>
             <a:noFill/>
-            <a:ln w="12700">
+            <a:ln w="25400">
               <a:solidFill>
                 <a:schemeClr val="tx1"/>
               </a:solidFill>
@@ -8043,7 +8009,7 @@
               <a:avLst/>
             </a:prstGeom>
             <a:noFill/>
-            <a:ln w="12700">
+            <a:ln w="25400">
               <a:solidFill>
                 <a:schemeClr val="tx1"/>
               </a:solidFill>
@@ -8095,7 +8061,7 @@
               <a:avLst/>
             </a:prstGeom>
             <a:noFill/>
-            <a:ln w="12700">
+            <a:ln w="25400">
               <a:solidFill>
                 <a:schemeClr val="tx1"/>
               </a:solidFill>
@@ -8129,11 +8095,6 @@
                 </a:rPr>
                 <a:t>6</a:t>
               </a:r>
-              <a:endParaRPr lang="en-US" sz="3200" dirty="0">
-                <a:solidFill>
-                  <a:srgbClr val="000000"/>
-                </a:solidFill>
-              </a:endParaRPr>
             </a:p>
           </p:txBody>
         </p:sp>
@@ -8258,11 +8219,6 @@
                 </a:rPr>
                 <a:t>Mid-Tier </a:t>
               </a:r>
-              <a:endParaRPr lang="en-US" dirty="0" smtClean="0">
-                <a:solidFill>
-                  <a:schemeClr val="tx1"/>
-                </a:solidFill>
-              </a:endParaRPr>
             </a:p>
             <a:p>
               <a:pPr algn="ctr"/>
@@ -8331,11 +8287,6 @@
                 </a:rPr>
                 <a:t>Mid-Tier </a:t>
               </a:r>
-              <a:endParaRPr lang="en-US" dirty="0" smtClean="0">
-                <a:solidFill>
-                  <a:schemeClr val="tx1"/>
-                </a:solidFill>
-              </a:endParaRPr>
             </a:p>
             <a:p>
               <a:pPr algn="ctr"/>
@@ -8841,7 +8792,6 @@
               <a:rPr lang="en-US" sz="2100" dirty="0"/>
               <a:t>Internal</a:t>
             </a:r>
-            <a:endParaRPr lang="en-US" sz="2100" dirty="0"/>
           </a:p>
         </p:txBody>
       </p:sp>
@@ -9074,7 +9024,6 @@
                 <a:rPr lang="en-US" sz="1800" dirty="0"/>
                 <a:t>Duplicator</a:t>
               </a:r>
-              <a:endParaRPr lang="en-US" sz="1800" dirty="0"/>
             </a:p>
           </p:txBody>
         </p:sp>
@@ -10097,21 +10046,8 @@
                     <a:srgbClr val="000000"/>
                   </a:solidFill>
                 </a:rPr>
-                <a:t>i</a:t>
+                <a:t>int-br-eth1</a:t>
               </a:r>
-              <a:r>
-                <a:rPr lang="en-US" sz="2400" dirty="0">
-                  <a:solidFill>
-                    <a:srgbClr val="000000"/>
-                  </a:solidFill>
-                </a:rPr>
-                <a:t>nt-br-eth1</a:t>
-              </a:r>
-              <a:endParaRPr lang="en-US" sz="2400" dirty="0">
-                <a:solidFill>
-                  <a:srgbClr val="000000"/>
-                </a:solidFill>
-              </a:endParaRPr>
             </a:p>
           </p:txBody>
         </p:sp>
@@ -10167,21 +10103,8 @@
                     <a:srgbClr val="000000"/>
                   </a:solidFill>
                 </a:rPr>
-                <a:t>p</a:t>
+                <a:t>phy-br-eth1</a:t>
               </a:r>
-              <a:r>
-                <a:rPr lang="en-US" sz="2100" dirty="0">
-                  <a:solidFill>
-                    <a:srgbClr val="000000"/>
-                  </a:solidFill>
-                </a:rPr>
-                <a:t>hy-br-eth1</a:t>
-              </a:r>
-              <a:endParaRPr lang="en-US" sz="2100" dirty="0">
-                <a:solidFill>
-                  <a:srgbClr val="000000"/>
-                </a:solidFill>
-              </a:endParaRPr>
             </a:p>
           </p:txBody>
         </p:sp>
@@ -10517,11 +10440,6 @@
                   </a:rPr>
                   <a:t>vnet0</a:t>
                 </a:r>
-                <a:endParaRPr lang="en-US" sz="2100" dirty="0">
-                  <a:solidFill>
-                    <a:schemeClr val="tx1"/>
-                  </a:solidFill>
-                </a:endParaRPr>
               </a:p>
             </p:txBody>
           </p:sp>
@@ -10704,11 +10622,6 @@
                 </a:rPr>
                 <a:t>vnet1</a:t>
               </a:r>
-              <a:endParaRPr lang="en-US" sz="2100" dirty="0">
-                <a:solidFill>
-                  <a:schemeClr val="tx1"/>
-                </a:solidFill>
-              </a:endParaRPr>
             </a:p>
           </p:txBody>
         </p:sp>
@@ -10890,11 +10803,6 @@
                 </a:rPr>
                 <a:t>vnet2</a:t>
               </a:r>
-              <a:endParaRPr lang="en-US" sz="2100" dirty="0">
-                <a:solidFill>
-                  <a:schemeClr val="tx1"/>
-                </a:solidFill>
-              </a:endParaRPr>
             </a:p>
           </p:txBody>
         </p:sp>
@@ -10952,11 +10860,6 @@
                 </a:rPr>
                 <a:t>VM 01</a:t>
               </a:r>
-              <a:endParaRPr lang="en-US" sz="2100" dirty="0">
-                <a:solidFill>
-                  <a:schemeClr val="tx1"/>
-                </a:solidFill>
-              </a:endParaRPr>
             </a:p>
           </p:txBody>
         </p:sp>
@@ -11014,11 +10917,6 @@
                 </a:rPr>
                 <a:t>eth0</a:t>
               </a:r>
-              <a:endParaRPr lang="en-US" sz="2100" dirty="0">
-                <a:solidFill>
-                  <a:schemeClr val="tx1"/>
-                </a:solidFill>
-              </a:endParaRPr>
             </a:p>
           </p:txBody>
         </p:sp>
@@ -11076,11 +10974,6 @@
                 </a:rPr>
                 <a:t>VM 02</a:t>
               </a:r>
-              <a:endParaRPr lang="en-US" sz="2100" dirty="0">
-                <a:solidFill>
-                  <a:schemeClr val="tx1"/>
-                </a:solidFill>
-              </a:endParaRPr>
             </a:p>
           </p:txBody>
         </p:sp>
@@ -11138,11 +11031,6 @@
                 </a:rPr>
                 <a:t>eth1</a:t>
               </a:r>
-              <a:endParaRPr lang="en-US" sz="2100" dirty="0">
-                <a:solidFill>
-                  <a:schemeClr val="tx1"/>
-                </a:solidFill>
-              </a:endParaRPr>
             </a:p>
           </p:txBody>
         </p:sp>
@@ -11200,11 +11088,6 @@
                 </a:rPr>
                 <a:t>VM 03</a:t>
               </a:r>
-              <a:endParaRPr lang="en-US" sz="2100" dirty="0">
-                <a:solidFill>
-                  <a:schemeClr val="tx1"/>
-                </a:solidFill>
-              </a:endParaRPr>
             </a:p>
           </p:txBody>
         </p:sp>
@@ -11262,11 +11145,6 @@
                 </a:rPr>
                 <a:t>eth2</a:t>
               </a:r>
-              <a:endParaRPr lang="en-US" sz="2100" dirty="0">
-                <a:solidFill>
-                  <a:schemeClr val="tx1"/>
-                </a:solidFill>
-              </a:endParaRPr>
             </a:p>
           </p:txBody>
         </p:sp>
@@ -11728,7 +11606,6 @@
                 <a:rPr lang="en-US" sz="2100" dirty="0"/>
                 <a:t>VLAN 1</a:t>
               </a:r>
-              <a:endParaRPr lang="en-US" sz="2100" dirty="0"/>
             </a:p>
           </p:txBody>
         </p:sp>
@@ -11758,7 +11635,6 @@
                 <a:rPr lang="en-US" sz="2100" dirty="0"/>
                 <a:t>VLAN 2</a:t>
               </a:r>
-              <a:endParaRPr lang="en-US" sz="2100" dirty="0"/>
             </a:p>
           </p:txBody>
         </p:sp>
@@ -12724,7 +12600,6 @@
                 <a:rPr lang="en-US" sz="2100" b="1" dirty="0"/>
                 <a:t>To/From Duplicator</a:t>
               </a:r>
-              <a:endParaRPr lang="en-US" sz="2100" b="1" dirty="0"/>
             </a:p>
           </p:txBody>
         </p:sp>
@@ -13353,11 +13228,6 @@
                 </a:rPr>
                 <a:t>IP namespace 1</a:t>
               </a:r>
-              <a:endParaRPr lang="en-US" sz="1800" b="1" dirty="0">
-                <a:solidFill>
-                  <a:srgbClr val="000000"/>
-                </a:solidFill>
-              </a:endParaRPr>
             </a:p>
           </p:txBody>
         </p:sp>
@@ -13439,11 +13309,6 @@
                 </a:rPr>
                 <a:t>IP namespace 2</a:t>
               </a:r>
-              <a:endParaRPr lang="en-US" sz="1800" b="1" dirty="0">
-                <a:solidFill>
-                  <a:srgbClr val="000000"/>
-                </a:solidFill>
-              </a:endParaRPr>
             </a:p>
           </p:txBody>
         </p:sp>
@@ -13553,7 +13418,6 @@
                 <a:rPr lang="en-US" sz="2100" b="1" dirty="0"/>
                 <a:t>To/From Duplicator</a:t>
               </a:r>
-              <a:endParaRPr lang="en-US" sz="2100" b="1" dirty="0"/>
             </a:p>
           </p:txBody>
         </p:sp>
@@ -13865,13 +13729,8 @@
             <a:p>
               <a:r>
                 <a:rPr lang="en-US" sz="2400" dirty="0"/>
-                <a:t>2</a:t>
+                <a:t>2: Connection Manager</a:t>
               </a:r>
-              <a:r>
-                <a:rPr lang="en-US" sz="2400" dirty="0"/>
-                <a:t>: Connection Manager</a:t>
-              </a:r>
-              <a:endParaRPr lang="en-US" sz="2400" dirty="0"/>
             </a:p>
           </p:txBody>
         </p:sp>
@@ -14550,7 +14409,6 @@
                 <a:rPr lang="en-US" sz="2400" dirty="0"/>
                 <a:t>5: Buffer Manager</a:t>
               </a:r>
-              <a:endParaRPr lang="en-US" sz="2400" dirty="0"/>
             </a:p>
           </p:txBody>
         </p:sp>
@@ -15554,11 +15412,6 @@
                 </a:rPr>
                 <a:t>Production</a:t>
               </a:r>
-              <a:endParaRPr lang="en-US" sz="3600" dirty="0">
-                <a:solidFill>
-                  <a:schemeClr val="tx1"/>
-                </a:solidFill>
-              </a:endParaRPr>
             </a:p>
           </p:txBody>
         </p:sp>
@@ -15942,11 +15795,6 @@
                 </a:rPr>
                 <a:t>4</a:t>
               </a:r>
-              <a:endParaRPr lang="en-US" sz="3200" dirty="0">
-                <a:solidFill>
-                  <a:srgbClr val="000000"/>
-                </a:solidFill>
-              </a:endParaRPr>
             </a:p>
           </p:txBody>
         </p:sp>
@@ -15999,11 +15847,6 @@
                 </a:rPr>
                 <a:t>1</a:t>
               </a:r>
-              <a:endParaRPr lang="en-US" sz="3200" dirty="0">
-                <a:solidFill>
-                  <a:srgbClr val="000000"/>
-                </a:solidFill>
-              </a:endParaRPr>
             </a:p>
           </p:txBody>
         </p:sp>
@@ -16160,11 +16003,6 @@
                 </a:rPr>
                 <a:t>6</a:t>
               </a:r>
-              <a:endParaRPr lang="en-US" sz="3200" dirty="0">
-                <a:solidFill>
-                  <a:srgbClr val="000000"/>
-                </a:solidFill>
-              </a:endParaRPr>
             </a:p>
           </p:txBody>
         </p:sp>
@@ -16201,28 +16039,639 @@
       </p:grpSpPr>
       <p:grpSp>
         <p:nvGrpSpPr>
-          <p:cNvPr id="4" name="Group 3"/>
+          <p:cNvPr id="2" name="Group 1"/>
           <p:cNvGrpSpPr/>
           <p:nvPr/>
         </p:nvGrpSpPr>
         <p:grpSpPr>
           <a:xfrm>
-            <a:off x="857871" y="1574871"/>
-            <a:ext cx="5587052" cy="6570883"/>
-            <a:chOff x="2726601" y="1744437"/>
-            <a:chExt cx="1927202" cy="2672156"/>
+            <a:off x="1144441" y="1908230"/>
+            <a:ext cx="7634197" cy="5504731"/>
+            <a:chOff x="1270050" y="2116811"/>
+            <a:chExt cx="7634197" cy="5504731"/>
           </a:xfrm>
         </p:grpSpPr>
+        <p:grpSp>
+          <p:nvGrpSpPr>
+            <p:cNvPr id="4" name="Group 3"/>
+            <p:cNvGrpSpPr/>
+            <p:nvPr/>
+          </p:nvGrpSpPr>
+          <p:grpSpPr>
+            <a:xfrm>
+              <a:off x="1270050" y="2116811"/>
+              <a:ext cx="5174874" cy="5504731"/>
+              <a:chOff x="2868778" y="1964825"/>
+              <a:chExt cx="1785025" cy="2238589"/>
+            </a:xfrm>
+          </p:grpSpPr>
+          <p:sp>
+            <p:nvSpPr>
+              <p:cNvPr id="6" name="Rectangle 5"/>
+              <p:cNvSpPr/>
+              <p:nvPr/>
+            </p:nvSpPr>
+            <p:spPr>
+              <a:xfrm>
+                <a:off x="3382016" y="2818931"/>
+                <a:ext cx="962757" cy="553633"/>
+              </a:xfrm>
+              <a:prstGeom prst="rect">
+                <a:avLst/>
+              </a:prstGeom>
+              <a:noFill/>
+              <a:ln w="25400">
+                <a:solidFill>
+                  <a:schemeClr val="tx1"/>
+                </a:solidFill>
+              </a:ln>
+              <a:effectLst/>
+            </p:spPr>
+            <p:style>
+              <a:lnRef idx="1">
+                <a:schemeClr val="accent1"/>
+              </a:lnRef>
+              <a:fillRef idx="3">
+                <a:schemeClr val="accent1"/>
+              </a:fillRef>
+              <a:effectRef idx="2">
+                <a:schemeClr val="accent1"/>
+              </a:effectRef>
+              <a:fontRef idx="minor">
+                <a:schemeClr val="lt1"/>
+              </a:fontRef>
+            </p:style>
+            <p:txBody>
+              <a:bodyPr rtlCol="0" anchor="ctr"/>
+              <a:lstStyle/>
+              <a:p>
+                <a:pPr algn="ctr"/>
+                <a:r>
+                  <a:rPr lang="en-US" sz="3200" dirty="0" smtClean="0">
+                    <a:solidFill>
+                      <a:schemeClr val="tx1"/>
+                    </a:solidFill>
+                  </a:rPr>
+                  <a:t>Proxy</a:t>
+                </a:r>
+              </a:p>
+              <a:p>
+                <a:pPr algn="ctr"/>
+                <a:r>
+                  <a:rPr lang="en-US" sz="3200" dirty="0" err="1" smtClean="0">
+                    <a:solidFill>
+                      <a:schemeClr val="tx1"/>
+                    </a:solidFill>
+                  </a:rPr>
+                  <a:t>Aggergator</a:t>
+                </a:r>
+                <a:endParaRPr lang="en-US" sz="3200" dirty="0">
+                  <a:solidFill>
+                    <a:schemeClr val="tx1"/>
+                  </a:solidFill>
+                </a:endParaRPr>
+              </a:p>
+            </p:txBody>
+          </p:sp>
+          <p:sp>
+            <p:nvSpPr>
+              <p:cNvPr id="7" name="Rectangle 6"/>
+              <p:cNvSpPr/>
+              <p:nvPr/>
+            </p:nvSpPr>
+            <p:spPr>
+              <a:xfrm>
+                <a:off x="2868778" y="1964825"/>
+                <a:ext cx="876178" cy="478493"/>
+              </a:xfrm>
+              <a:prstGeom prst="rect">
+                <a:avLst/>
+              </a:prstGeom>
+              <a:noFill/>
+              <a:ln w="25400">
+                <a:solidFill>
+                  <a:schemeClr val="tx1"/>
+                </a:solidFill>
+              </a:ln>
+              <a:effectLst/>
+            </p:spPr>
+            <p:style>
+              <a:lnRef idx="1">
+                <a:schemeClr val="accent1"/>
+              </a:lnRef>
+              <a:fillRef idx="3">
+                <a:schemeClr val="accent1"/>
+              </a:fillRef>
+              <a:effectRef idx="2">
+                <a:schemeClr val="accent1"/>
+              </a:effectRef>
+              <a:fontRef idx="minor">
+                <a:schemeClr val="lt1"/>
+              </a:fontRef>
+            </p:style>
+            <p:txBody>
+              <a:bodyPr rtlCol="0" anchor="ctr"/>
+              <a:lstStyle/>
+              <a:p>
+                <a:pPr algn="ctr"/>
+                <a:r>
+                  <a:rPr lang="en-US" sz="3200" dirty="0" smtClean="0">
+                    <a:solidFill>
+                      <a:schemeClr val="tx1"/>
+                    </a:solidFill>
+                  </a:rPr>
+                  <a:t>Mid-Tier </a:t>
+                </a:r>
+                <a:endParaRPr lang="en-US" sz="3200" dirty="0" smtClean="0">
+                  <a:solidFill>
+                    <a:schemeClr val="tx1"/>
+                  </a:solidFill>
+                </a:endParaRPr>
+              </a:p>
+              <a:p>
+                <a:pPr algn="ctr"/>
+                <a:r>
+                  <a:rPr lang="en-US" sz="3200" dirty="0" smtClean="0">
+                    <a:solidFill>
+                      <a:schemeClr val="tx1"/>
+                    </a:solidFill>
+                  </a:rPr>
+                  <a:t>Production</a:t>
+                </a:r>
+                <a:endParaRPr lang="en-US" sz="3200" dirty="0">
+                  <a:solidFill>
+                    <a:schemeClr val="tx1"/>
+                  </a:solidFill>
+                </a:endParaRPr>
+              </a:p>
+            </p:txBody>
+          </p:sp>
+          <p:sp>
+            <p:nvSpPr>
+              <p:cNvPr id="8" name="Rectangle 7"/>
+              <p:cNvSpPr/>
+              <p:nvPr/>
+            </p:nvSpPr>
+            <p:spPr>
+              <a:xfrm>
+                <a:off x="2868778" y="3734085"/>
+                <a:ext cx="876178" cy="469329"/>
+              </a:xfrm>
+              <a:prstGeom prst="rect">
+                <a:avLst/>
+              </a:prstGeom>
+              <a:noFill/>
+              <a:ln w="25400">
+                <a:solidFill>
+                  <a:schemeClr val="tx1"/>
+                </a:solidFill>
+              </a:ln>
+              <a:effectLst/>
+            </p:spPr>
+            <p:style>
+              <a:lnRef idx="1">
+                <a:schemeClr val="accent1"/>
+              </a:lnRef>
+              <a:fillRef idx="3">
+                <a:schemeClr val="accent1"/>
+              </a:fillRef>
+              <a:effectRef idx="2">
+                <a:schemeClr val="accent1"/>
+              </a:effectRef>
+              <a:fontRef idx="minor">
+                <a:schemeClr val="lt1"/>
+              </a:fontRef>
+            </p:style>
+            <p:txBody>
+              <a:bodyPr rtlCol="0" anchor="ctr"/>
+              <a:lstStyle/>
+              <a:p>
+                <a:pPr algn="ctr"/>
+                <a:r>
+                  <a:rPr lang="en-US" sz="3200" dirty="0" smtClean="0">
+                    <a:solidFill>
+                      <a:schemeClr val="tx1"/>
+                    </a:solidFill>
+                  </a:rPr>
+                  <a:t>Mid-Tier </a:t>
+                </a:r>
+                <a:endParaRPr lang="en-US" sz="3200" dirty="0" smtClean="0">
+                  <a:solidFill>
+                    <a:schemeClr val="tx1"/>
+                  </a:solidFill>
+                </a:endParaRPr>
+              </a:p>
+              <a:p>
+                <a:pPr algn="ctr"/>
+                <a:r>
+                  <a:rPr lang="en-US" sz="3200" dirty="0" smtClean="0">
+                    <a:solidFill>
+                      <a:schemeClr val="tx1"/>
+                    </a:solidFill>
+                  </a:rPr>
+                  <a:t>Clone</a:t>
+                </a:r>
+                <a:endParaRPr lang="en-US" dirty="0">
+                  <a:solidFill>
+                    <a:schemeClr val="tx1"/>
+                  </a:solidFill>
+                </a:endParaRPr>
+              </a:p>
+            </p:txBody>
+          </p:sp>
+          <p:cxnSp>
+            <p:nvCxnSpPr>
+              <p:cNvPr id="10" name="Straight Arrow Connector 9"/>
+              <p:cNvCxnSpPr/>
+              <p:nvPr/>
+            </p:nvCxnSpPr>
+            <p:spPr>
+              <a:xfrm flipH="1" flipV="1">
+                <a:off x="3162440" y="2443318"/>
+                <a:ext cx="557767" cy="369121"/>
+              </a:xfrm>
+              <a:prstGeom prst="straightConnector1">
+                <a:avLst/>
+              </a:prstGeom>
+              <a:ln>
+                <a:solidFill>
+                  <a:schemeClr val="tx1"/>
+                </a:solidFill>
+                <a:tailEnd type="arrow"/>
+              </a:ln>
+              <a:effectLst/>
+            </p:spPr>
+            <p:style>
+              <a:lnRef idx="2">
+                <a:schemeClr val="accent1"/>
+              </a:lnRef>
+              <a:fillRef idx="0">
+                <a:schemeClr val="accent1"/>
+              </a:fillRef>
+              <a:effectRef idx="1">
+                <a:schemeClr val="accent1"/>
+              </a:effectRef>
+              <a:fontRef idx="minor">
+                <a:schemeClr val="tx1"/>
+              </a:fontRef>
+            </p:style>
+          </p:cxnSp>
+          <p:cxnSp>
+            <p:nvCxnSpPr>
+              <p:cNvPr id="11" name="Straight Arrow Connector 10"/>
+              <p:cNvCxnSpPr/>
+              <p:nvPr/>
+            </p:nvCxnSpPr>
+            <p:spPr>
+              <a:xfrm flipH="1">
+                <a:off x="3382016" y="3372564"/>
+                <a:ext cx="578083" cy="354162"/>
+              </a:xfrm>
+              <a:prstGeom prst="straightConnector1">
+                <a:avLst/>
+              </a:prstGeom>
+              <a:ln>
+                <a:solidFill>
+                  <a:schemeClr val="tx1"/>
+                </a:solidFill>
+                <a:tailEnd type="arrow"/>
+              </a:ln>
+              <a:effectLst/>
+            </p:spPr>
+            <p:style>
+              <a:lnRef idx="2">
+                <a:schemeClr val="accent1"/>
+              </a:lnRef>
+              <a:fillRef idx="0">
+                <a:schemeClr val="accent1"/>
+              </a:fillRef>
+              <a:effectRef idx="1">
+                <a:schemeClr val="accent1"/>
+              </a:effectRef>
+              <a:fontRef idx="minor">
+                <a:schemeClr val="tx1"/>
+              </a:fontRef>
+            </p:style>
+          </p:cxnSp>
+          <p:cxnSp>
+            <p:nvCxnSpPr>
+              <p:cNvPr id="12" name="Straight Arrow Connector 11"/>
+              <p:cNvCxnSpPr/>
+              <p:nvPr/>
+            </p:nvCxnSpPr>
+            <p:spPr>
+              <a:xfrm>
+                <a:off x="3382016" y="2443318"/>
+                <a:ext cx="578083" cy="369119"/>
+              </a:xfrm>
+              <a:prstGeom prst="straightConnector1">
+                <a:avLst/>
+              </a:prstGeom>
+              <a:ln>
+                <a:solidFill>
+                  <a:schemeClr val="tx1"/>
+                </a:solidFill>
+                <a:tailEnd type="arrow"/>
+              </a:ln>
+              <a:effectLst/>
+            </p:spPr>
+            <p:style>
+              <a:lnRef idx="2">
+                <a:schemeClr val="accent1"/>
+              </a:lnRef>
+              <a:fillRef idx="0">
+                <a:schemeClr val="accent1"/>
+              </a:fillRef>
+              <a:effectRef idx="1">
+                <a:schemeClr val="accent1"/>
+              </a:effectRef>
+              <a:fontRef idx="minor">
+                <a:schemeClr val="tx1"/>
+              </a:fontRef>
+            </p:style>
+          </p:cxnSp>
+          <p:cxnSp>
+            <p:nvCxnSpPr>
+              <p:cNvPr id="13" name="Straight Arrow Connector 12"/>
+              <p:cNvCxnSpPr/>
+              <p:nvPr/>
+            </p:nvCxnSpPr>
+            <p:spPr>
+              <a:xfrm flipV="1">
+                <a:off x="3162440" y="3392867"/>
+                <a:ext cx="548137" cy="333859"/>
+              </a:xfrm>
+              <a:prstGeom prst="straightConnector1">
+                <a:avLst/>
+              </a:prstGeom>
+              <a:ln>
+                <a:solidFill>
+                  <a:schemeClr val="tx1"/>
+                </a:solidFill>
+                <a:tailEnd type="arrow"/>
+              </a:ln>
+              <a:effectLst/>
+            </p:spPr>
+            <p:style>
+              <a:lnRef idx="2">
+                <a:schemeClr val="accent1"/>
+              </a:lnRef>
+              <a:fillRef idx="0">
+                <a:schemeClr val="accent1"/>
+              </a:fillRef>
+              <a:effectRef idx="1">
+                <a:schemeClr val="accent1"/>
+              </a:effectRef>
+              <a:fontRef idx="minor">
+                <a:schemeClr val="tx1"/>
+              </a:fontRef>
+            </p:style>
+          </p:cxnSp>
+          <p:sp>
+            <p:nvSpPr>
+              <p:cNvPr id="15" name="Oval 14"/>
+              <p:cNvSpPr/>
+              <p:nvPr/>
+            </p:nvSpPr>
+            <p:spPr>
+              <a:xfrm>
+                <a:off x="3763294" y="2473665"/>
+                <a:ext cx="210947" cy="225848"/>
+              </a:xfrm>
+              <a:prstGeom prst="ellipse">
+                <a:avLst/>
+              </a:prstGeom>
+              <a:noFill/>
+              <a:ln w="12700">
+                <a:solidFill>
+                  <a:schemeClr val="tx1"/>
+                </a:solidFill>
+              </a:ln>
+              <a:effectLst/>
+            </p:spPr>
+            <p:style>
+              <a:lnRef idx="1">
+                <a:schemeClr val="accent1"/>
+              </a:lnRef>
+              <a:fillRef idx="3">
+                <a:schemeClr val="accent1"/>
+              </a:fillRef>
+              <a:effectRef idx="2">
+                <a:schemeClr val="accent1"/>
+              </a:effectRef>
+              <a:fontRef idx="minor">
+                <a:schemeClr val="lt1"/>
+              </a:fontRef>
+            </p:style>
+            <p:txBody>
+              <a:bodyPr rtlCol="0" anchor="ctr"/>
+              <a:lstStyle/>
+              <a:p>
+                <a:pPr algn="ctr"/>
+                <a:r>
+                  <a:rPr lang="en-US" sz="2800" dirty="0">
+                    <a:solidFill>
+                      <a:srgbClr val="000000"/>
+                    </a:solidFill>
+                  </a:rPr>
+                  <a:t>1</a:t>
+                </a:r>
+              </a:p>
+            </p:txBody>
+          </p:sp>
+          <p:sp>
+            <p:nvSpPr>
+              <p:cNvPr id="16" name="Oval 15"/>
+              <p:cNvSpPr/>
+              <p:nvPr/>
+            </p:nvSpPr>
+            <p:spPr>
+              <a:xfrm>
+                <a:off x="3087372" y="2586589"/>
+                <a:ext cx="223094" cy="225848"/>
+              </a:xfrm>
+              <a:prstGeom prst="ellipse">
+                <a:avLst/>
+              </a:prstGeom>
+              <a:noFill/>
+              <a:ln w="12700">
+                <a:solidFill>
+                  <a:schemeClr val="tx1"/>
+                </a:solidFill>
+              </a:ln>
+              <a:effectLst/>
+            </p:spPr>
+            <p:style>
+              <a:lnRef idx="1">
+                <a:schemeClr val="accent1"/>
+              </a:lnRef>
+              <a:fillRef idx="3">
+                <a:schemeClr val="accent1"/>
+              </a:fillRef>
+              <a:effectRef idx="2">
+                <a:schemeClr val="accent1"/>
+              </a:effectRef>
+              <a:fontRef idx="minor">
+                <a:schemeClr val="lt1"/>
+              </a:fontRef>
+            </p:style>
+            <p:txBody>
+              <a:bodyPr rtlCol="0" anchor="ctr"/>
+              <a:lstStyle/>
+              <a:p>
+                <a:pPr algn="ctr"/>
+                <a:r>
+                  <a:rPr lang="en-US" sz="2800" dirty="0">
+                    <a:solidFill>
+                      <a:srgbClr val="000000"/>
+                    </a:solidFill>
+                  </a:rPr>
+                  <a:t>2</a:t>
+                </a:r>
+              </a:p>
+            </p:txBody>
+          </p:sp>
+          <p:sp>
+            <p:nvSpPr>
+              <p:cNvPr id="19" name="Oval 18"/>
+              <p:cNvSpPr/>
+              <p:nvPr/>
+            </p:nvSpPr>
+            <p:spPr>
+              <a:xfrm>
+                <a:off x="3087372" y="3359589"/>
+                <a:ext cx="189787" cy="225848"/>
+              </a:xfrm>
+              <a:prstGeom prst="ellipse">
+                <a:avLst/>
+              </a:prstGeom>
+              <a:noFill/>
+              <a:ln w="12700">
+                <a:solidFill>
+                  <a:schemeClr val="tx1"/>
+                </a:solidFill>
+              </a:ln>
+              <a:effectLst/>
+            </p:spPr>
+            <p:style>
+              <a:lnRef idx="1">
+                <a:schemeClr val="accent1"/>
+              </a:lnRef>
+              <a:fillRef idx="3">
+                <a:schemeClr val="accent1"/>
+              </a:fillRef>
+              <a:effectRef idx="2">
+                <a:schemeClr val="accent1"/>
+              </a:effectRef>
+              <a:fontRef idx="minor">
+                <a:schemeClr val="lt1"/>
+              </a:fontRef>
+            </p:style>
+            <p:txBody>
+              <a:bodyPr rtlCol="0" anchor="ctr"/>
+              <a:lstStyle/>
+              <a:p>
+                <a:pPr algn="ctr"/>
+                <a:r>
+                  <a:rPr lang="en-US" sz="2800" dirty="0">
+                    <a:solidFill>
+                      <a:srgbClr val="000000"/>
+                    </a:solidFill>
+                  </a:rPr>
+                  <a:t>5</a:t>
+                </a:r>
+              </a:p>
+            </p:txBody>
+          </p:sp>
+          <p:sp>
+            <p:nvSpPr>
+              <p:cNvPr id="20" name="TextBox 19"/>
+              <p:cNvSpPr txBox="1"/>
+              <p:nvPr/>
+            </p:nvSpPr>
+            <p:spPr>
+              <a:xfrm>
+                <a:off x="4590104" y="3520208"/>
+                <a:ext cx="63699" cy="206518"/>
+              </a:xfrm>
+              <a:prstGeom prst="rect">
+                <a:avLst/>
+              </a:prstGeom>
+              <a:noFill/>
+            </p:spPr>
+            <p:txBody>
+              <a:bodyPr wrap="none" rtlCol="0">
+                <a:spAutoFit/>
+              </a:bodyPr>
+              <a:lstStyle/>
+              <a:p>
+                <a:endParaRPr lang="en-US" dirty="0"/>
+              </a:p>
+            </p:txBody>
+          </p:sp>
+          <p:sp>
+            <p:nvSpPr>
+              <p:cNvPr id="21" name="Oval 20"/>
+              <p:cNvSpPr/>
+              <p:nvPr/>
+            </p:nvSpPr>
+            <p:spPr>
+              <a:xfrm>
+                <a:off x="3782550" y="3469088"/>
+                <a:ext cx="217003" cy="225848"/>
+              </a:xfrm>
+              <a:prstGeom prst="ellipse">
+                <a:avLst/>
+              </a:prstGeom>
+              <a:noFill/>
+              <a:ln w="12700">
+                <a:solidFill>
+                  <a:schemeClr val="tx1"/>
+                </a:solidFill>
+              </a:ln>
+              <a:effectLst/>
+            </p:spPr>
+            <p:style>
+              <a:lnRef idx="1">
+                <a:schemeClr val="accent1"/>
+              </a:lnRef>
+              <a:fillRef idx="3">
+                <a:schemeClr val="accent1"/>
+              </a:fillRef>
+              <a:effectRef idx="2">
+                <a:schemeClr val="accent1"/>
+              </a:effectRef>
+              <a:fontRef idx="minor">
+                <a:schemeClr val="lt1"/>
+              </a:fontRef>
+            </p:style>
+            <p:txBody>
+              <a:bodyPr rtlCol="0" anchor="ctr"/>
+              <a:lstStyle/>
+              <a:p>
+                <a:pPr algn="ctr"/>
+                <a:r>
+                  <a:rPr lang="en-US" sz="2800" dirty="0">
+                    <a:solidFill>
+                      <a:srgbClr val="000000"/>
+                    </a:solidFill>
+                  </a:rPr>
+                  <a:t>6</a:t>
+                </a:r>
+              </a:p>
+            </p:txBody>
+          </p:sp>
+        </p:grpSp>
         <p:sp>
           <p:nvSpPr>
-            <p:cNvPr id="6" name="Rectangle 5"/>
+            <p:cNvPr id="27" name="Rectangle 26"/>
             <p:cNvSpPr/>
             <p:nvPr/>
           </p:nvSpPr>
           <p:spPr>
             <a:xfrm>
-              <a:off x="3382016" y="2818931"/>
-              <a:ext cx="962757" cy="553633"/>
+              <a:off x="6795610" y="4201105"/>
+              <a:ext cx="2108637" cy="1361393"/>
             </a:xfrm>
             <a:prstGeom prst="rect">
               <a:avLst/>
@@ -16250,144 +16699,38 @@
             </a:fontRef>
           </p:style>
           <p:txBody>
-            <a:bodyPr rtlCol="0" anchor="ctr"/>
+            <a:bodyPr lIns="137840" tIns="68918" rIns="137840" bIns="68918" rtlCol="0" anchor="ctr"/>
             <a:lstStyle/>
             <a:p>
               <a:pPr algn="ctr"/>
               <a:r>
-                <a:rPr lang="en-US" dirty="0" smtClean="0">
+                <a:rPr lang="en-US" sz="3200" dirty="0" smtClean="0">
                   <a:solidFill>
                     <a:schemeClr val="tx1"/>
                   </a:solidFill>
                 </a:rPr>
-                <a:t>Proxy</a:t>
+                <a:t>Backend</a:t>
+              </a:r>
+              <a:r>
+                <a:rPr lang="en-US" sz="3200" dirty="0" smtClean="0">
+                  <a:solidFill>
+                    <a:schemeClr val="tx1"/>
+                  </a:solidFill>
+                </a:rPr>
+                <a:t>-</a:t>
               </a:r>
             </a:p>
             <a:p>
               <a:pPr algn="ctr"/>
               <a:r>
-                <a:rPr lang="en-US" dirty="0" err="1" smtClean="0">
+                <a:rPr lang="en-US" sz="3200" dirty="0" smtClean="0">
                   <a:solidFill>
                     <a:schemeClr val="tx1"/>
                   </a:solidFill>
                 </a:rPr>
-                <a:t>Aggergator</a:t>
+                <a:t>Server</a:t>
               </a:r>
-              <a:endParaRPr lang="en-US" dirty="0">
-                <a:solidFill>
-                  <a:schemeClr val="tx1"/>
-                </a:solidFill>
-              </a:endParaRPr>
-            </a:p>
-          </p:txBody>
-        </p:sp>
-        <p:sp>
-          <p:nvSpPr>
-            <p:cNvPr id="7" name="Rectangle 6"/>
-            <p:cNvSpPr/>
-            <p:nvPr/>
-          </p:nvSpPr>
-          <p:spPr>
-            <a:xfrm>
-              <a:off x="2726601" y="1744437"/>
-              <a:ext cx="1242493" cy="478493"/>
-            </a:xfrm>
-            <a:prstGeom prst="rect">
-              <a:avLst/>
-            </a:prstGeom>
-            <a:noFill/>
-            <a:ln w="25400">
-              <a:solidFill>
-                <a:schemeClr val="tx1"/>
-              </a:solidFill>
-            </a:ln>
-            <a:effectLst/>
-          </p:spPr>
-          <p:style>
-            <a:lnRef idx="1">
-              <a:schemeClr val="accent1"/>
-            </a:lnRef>
-            <a:fillRef idx="3">
-              <a:schemeClr val="accent1"/>
-            </a:fillRef>
-            <a:effectRef idx="2">
-              <a:schemeClr val="accent1"/>
-            </a:effectRef>
-            <a:fontRef idx="minor">
-              <a:schemeClr val="lt1"/>
-            </a:fontRef>
-          </p:style>
-          <p:txBody>
-            <a:bodyPr rtlCol="0" anchor="ctr"/>
-            <a:lstStyle/>
-            <a:p>
-              <a:pPr algn="ctr"/>
-              <a:r>
-                <a:rPr lang="en-US" dirty="0" smtClean="0">
-                  <a:solidFill>
-                    <a:schemeClr val="tx1"/>
-                  </a:solidFill>
-                </a:rPr>
-                <a:t>Mid-Tier Production</a:t>
-              </a:r>
-              <a:endParaRPr lang="en-US" dirty="0">
-                <a:solidFill>
-                  <a:schemeClr val="tx1"/>
-                </a:solidFill>
-              </a:endParaRPr>
-            </a:p>
-          </p:txBody>
-        </p:sp>
-        <p:sp>
-          <p:nvSpPr>
-            <p:cNvPr id="8" name="Rectangle 7"/>
-            <p:cNvSpPr/>
-            <p:nvPr/>
-          </p:nvSpPr>
-          <p:spPr>
-            <a:xfrm>
-              <a:off x="2736336" y="3947264"/>
-              <a:ext cx="1242493" cy="469329"/>
-            </a:xfrm>
-            <a:prstGeom prst="rect">
-              <a:avLst/>
-            </a:prstGeom>
-            <a:noFill/>
-            <a:ln w="25400">
-              <a:solidFill>
-                <a:schemeClr val="tx1"/>
-              </a:solidFill>
-            </a:ln>
-            <a:effectLst/>
-          </p:spPr>
-          <p:style>
-            <a:lnRef idx="1">
-              <a:schemeClr val="accent1"/>
-            </a:lnRef>
-            <a:fillRef idx="3">
-              <a:schemeClr val="accent1"/>
-            </a:fillRef>
-            <a:effectRef idx="2">
-              <a:schemeClr val="accent1"/>
-            </a:effectRef>
-            <a:fontRef idx="minor">
-              <a:schemeClr val="lt1"/>
-            </a:fontRef>
-          </p:style>
-          <p:txBody>
-            <a:bodyPr rtlCol="0" anchor="ctr"/>
-            <a:lstStyle/>
-            <a:p>
-              <a:pPr algn="ctr"/>
-              <a:r>
-                <a:rPr lang="en-US" dirty="0" smtClean="0">
-                  <a:solidFill>
-                    <a:schemeClr val="tx1"/>
-                  </a:solidFill>
-                </a:rPr>
-                <a:t>Mid-Tier Clone</a:t>
-              </a:r>
-              <a:endParaRPr lang="en-US" dirty="0">
+              <a:endParaRPr lang="en-US" sz="3200" dirty="0">
                 <a:solidFill>
                   <a:schemeClr val="tx1"/>
                 </a:solidFill>
@@ -16397,14 +16740,14 @@
         </p:sp>
         <p:cxnSp>
           <p:nvCxnSpPr>
-            <p:cNvPr id="10" name="Straight Arrow Connector 9"/>
+            <p:cNvPr id="28" name="Straight Arrow Connector 27"/>
             <p:cNvCxnSpPr/>
             <p:nvPr/>
           </p:nvCxnSpPr>
           <p:spPr>
-            <a:xfrm flipH="1" flipV="1">
-              <a:off x="3147782" y="2222930"/>
-              <a:ext cx="519470" cy="589509"/>
+            <a:xfrm>
+              <a:off x="5549035" y="4660596"/>
+              <a:ext cx="1246581" cy="0"/>
             </a:xfrm>
             <a:prstGeom prst="straightConnector1">
               <a:avLst/>
@@ -16434,90 +16777,14 @@
         </p:cxnSp>
         <p:cxnSp>
           <p:nvCxnSpPr>
-            <p:cNvPr id="11" name="Straight Arrow Connector 10"/>
-            <p:cNvCxnSpPr>
-              <a:endCxn id="8" idx="0"/>
-            </p:cNvCxnSpPr>
+            <p:cNvPr id="31" name="Straight Arrow Connector 30"/>
+            <p:cNvCxnSpPr/>
             <p:nvPr/>
           </p:nvCxnSpPr>
           <p:spPr>
             <a:xfrm flipH="1">
-              <a:off x="3357583" y="3392865"/>
-              <a:ext cx="577777" cy="554399"/>
-            </a:xfrm>
-            <a:prstGeom prst="straightConnector1">
-              <a:avLst/>
-            </a:prstGeom>
-            <a:ln>
-              <a:solidFill>
-                <a:schemeClr val="tx1"/>
-              </a:solidFill>
-              <a:tailEnd type="arrow"/>
-            </a:ln>
-            <a:effectLst/>
-          </p:spPr>
-          <p:style>
-            <a:lnRef idx="2">
-              <a:schemeClr val="accent1"/>
-            </a:lnRef>
-            <a:fillRef idx="0">
-              <a:schemeClr val="accent1"/>
-            </a:fillRef>
-            <a:effectRef idx="1">
-              <a:schemeClr val="accent1"/>
-            </a:effectRef>
-            <a:fontRef idx="minor">
-              <a:schemeClr val="tx1"/>
-            </a:fontRef>
-          </p:style>
-        </p:cxnSp>
-        <p:cxnSp>
-          <p:nvCxnSpPr>
-            <p:cNvPr id="12" name="Straight Arrow Connector 11"/>
-            <p:cNvCxnSpPr/>
-            <p:nvPr/>
-          </p:nvCxnSpPr>
-          <p:spPr>
-            <a:xfrm>
-              <a:off x="3382016" y="2233786"/>
-              <a:ext cx="539570" cy="578651"/>
-            </a:xfrm>
-            <a:prstGeom prst="straightConnector1">
-              <a:avLst/>
-            </a:prstGeom>
-            <a:ln>
-              <a:solidFill>
-                <a:schemeClr val="tx1"/>
-              </a:solidFill>
-              <a:tailEnd type="arrow"/>
-            </a:ln>
-            <a:effectLst/>
-          </p:spPr>
-          <p:style>
-            <a:lnRef idx="2">
-              <a:schemeClr val="accent1"/>
-            </a:lnRef>
-            <a:fillRef idx="0">
-              <a:schemeClr val="accent1"/>
-            </a:fillRef>
-            <a:effectRef idx="1">
-              <a:schemeClr val="accent1"/>
-            </a:effectRef>
-            <a:fontRef idx="minor">
-              <a:schemeClr val="tx1"/>
-            </a:fontRef>
-          </p:style>
-        </p:cxnSp>
-        <p:cxnSp>
-          <p:nvCxnSpPr>
-            <p:cNvPr id="13" name="Straight Arrow Connector 12"/>
-            <p:cNvCxnSpPr/>
-            <p:nvPr/>
-          </p:nvCxnSpPr>
-          <p:spPr>
-            <a:xfrm flipV="1">
-              <a:off x="3147782" y="3392867"/>
-              <a:ext cx="519469" cy="525991"/>
+              <a:off x="5549029" y="5194473"/>
+              <a:ext cx="1246582" cy="0"/>
             </a:xfrm>
             <a:prstGeom prst="straightConnector1">
               <a:avLst/>
@@ -16547,14 +16814,14 @@
         </p:cxnSp>
         <p:sp>
           <p:nvSpPr>
-            <p:cNvPr id="15" name="Oval 14"/>
+            <p:cNvPr id="18" name="Oval 17"/>
             <p:cNvSpPr/>
             <p:nvPr/>
           </p:nvSpPr>
           <p:spPr>
             <a:xfrm>
-              <a:off x="3724413" y="2300626"/>
-              <a:ext cx="359963" cy="225848"/>
+              <a:off x="5847773" y="4009167"/>
+              <a:ext cx="597149" cy="555364"/>
             </a:xfrm>
             <a:prstGeom prst="ellipse">
               <a:avLst/>
@@ -16582,36 +16849,31 @@
             </a:fontRef>
           </p:style>
           <p:txBody>
-            <a:bodyPr rtlCol="0" anchor="ctr"/>
+            <a:bodyPr lIns="137840" tIns="68918" rIns="137840" bIns="68918" rtlCol="0" anchor="ctr"/>
             <a:lstStyle/>
             <a:p>
               <a:pPr algn="ctr"/>
               <a:r>
-                <a:rPr lang="en-US" sz="1800" dirty="0">
+                <a:rPr lang="en-US" sz="2800" dirty="0">
                   <a:solidFill>
                     <a:srgbClr val="000000"/>
                   </a:solidFill>
                 </a:rPr>
-                <a:t>1</a:t>
+                <a:t>3</a:t>
               </a:r>
-              <a:endParaRPr lang="en-US" sz="1800" dirty="0">
-                <a:solidFill>
-                  <a:srgbClr val="000000"/>
-                </a:solidFill>
-              </a:endParaRPr>
             </a:p>
           </p:txBody>
         </p:sp>
         <p:sp>
           <p:nvSpPr>
-            <p:cNvPr id="16" name="Oval 15"/>
+            <p:cNvPr id="22" name="Oval 21"/>
             <p:cNvSpPr/>
             <p:nvPr/>
           </p:nvSpPr>
           <p:spPr>
             <a:xfrm>
-              <a:off x="2967800" y="2413550"/>
-              <a:ext cx="359963" cy="225848"/>
+              <a:off x="5847763" y="5368545"/>
+              <a:ext cx="655129" cy="555364"/>
             </a:xfrm>
             <a:prstGeom prst="ellipse">
               <a:avLst/>
@@ -16639,402 +16901,22 @@
             </a:fontRef>
           </p:style>
           <p:txBody>
-            <a:bodyPr rtlCol="0" anchor="ctr"/>
+            <a:bodyPr lIns="137840" tIns="68918" rIns="137840" bIns="68918" rtlCol="0" anchor="ctr"/>
             <a:lstStyle/>
             <a:p>
               <a:pPr algn="ctr"/>
               <a:r>
-                <a:rPr lang="en-US" sz="1800" dirty="0">
+                <a:rPr lang="en-US" sz="2800" dirty="0">
                   <a:solidFill>
                     <a:srgbClr val="000000"/>
                   </a:solidFill>
                 </a:rPr>
-                <a:t>2</a:t>
-              </a:r>
-              <a:endParaRPr lang="en-US" sz="1800" dirty="0">
-                <a:solidFill>
-                  <a:srgbClr val="000000"/>
-                </a:solidFill>
-              </a:endParaRPr>
-            </a:p>
-          </p:txBody>
-        </p:sp>
-        <p:sp>
-          <p:nvSpPr>
-            <p:cNvPr id="19" name="Oval 18"/>
-            <p:cNvSpPr/>
-            <p:nvPr/>
-          </p:nvSpPr>
-          <p:spPr>
-            <a:xfrm>
-              <a:off x="2934493" y="3520208"/>
-              <a:ext cx="359963" cy="225848"/>
-            </a:xfrm>
-            <a:prstGeom prst="ellipse">
-              <a:avLst/>
-            </a:prstGeom>
-            <a:noFill/>
-            <a:ln w="12700">
-              <a:solidFill>
-                <a:schemeClr val="tx1"/>
-              </a:solidFill>
-            </a:ln>
-            <a:effectLst/>
-          </p:spPr>
-          <p:style>
-            <a:lnRef idx="1">
-              <a:schemeClr val="accent1"/>
-            </a:lnRef>
-            <a:fillRef idx="3">
-              <a:schemeClr val="accent1"/>
-            </a:fillRef>
-            <a:effectRef idx="2">
-              <a:schemeClr val="accent1"/>
-            </a:effectRef>
-            <a:fontRef idx="minor">
-              <a:schemeClr val="lt1"/>
-            </a:fontRef>
-          </p:style>
-          <p:txBody>
-            <a:bodyPr rtlCol="0" anchor="ctr"/>
-            <a:lstStyle/>
-            <a:p>
-              <a:pPr algn="ctr"/>
-              <a:r>
-                <a:rPr lang="en-US" sz="1800" dirty="0">
-                  <a:solidFill>
-                    <a:srgbClr val="000000"/>
-                  </a:solidFill>
-                </a:rPr>
-                <a:t>5</a:t>
+                <a:t>4</a:t>
               </a:r>
             </a:p>
           </p:txBody>
         </p:sp>
-        <p:sp>
-          <p:nvSpPr>
-            <p:cNvPr id="20" name="TextBox 19"/>
-            <p:cNvSpPr txBox="1"/>
-            <p:nvPr/>
-          </p:nvSpPr>
-          <p:spPr>
-            <a:xfrm>
-              <a:off x="4590104" y="3520208"/>
-              <a:ext cx="63699" cy="206518"/>
-            </a:xfrm>
-            <a:prstGeom prst="rect">
-              <a:avLst/>
-            </a:prstGeom>
-            <a:noFill/>
-          </p:spPr>
-          <p:txBody>
-            <a:bodyPr wrap="none" rtlCol="0">
-              <a:spAutoFit/>
-            </a:bodyPr>
-            <a:lstStyle/>
-            <a:p>
-              <a:endParaRPr lang="en-US" dirty="0"/>
-            </a:p>
-          </p:txBody>
-        </p:sp>
-        <p:sp>
-          <p:nvSpPr>
-            <p:cNvPr id="21" name="Oval 20"/>
-            <p:cNvSpPr/>
-            <p:nvPr/>
-          </p:nvSpPr>
-          <p:spPr>
-            <a:xfrm>
-              <a:off x="3741604" y="3582012"/>
-              <a:ext cx="359963" cy="225848"/>
-            </a:xfrm>
-            <a:prstGeom prst="ellipse">
-              <a:avLst/>
-            </a:prstGeom>
-            <a:noFill/>
-            <a:ln w="12700">
-              <a:solidFill>
-                <a:schemeClr val="tx1"/>
-              </a:solidFill>
-            </a:ln>
-            <a:effectLst/>
-          </p:spPr>
-          <p:style>
-            <a:lnRef idx="1">
-              <a:schemeClr val="accent1"/>
-            </a:lnRef>
-            <a:fillRef idx="3">
-              <a:schemeClr val="accent1"/>
-            </a:fillRef>
-            <a:effectRef idx="2">
-              <a:schemeClr val="accent1"/>
-            </a:effectRef>
-            <a:fontRef idx="minor">
-              <a:schemeClr val="lt1"/>
-            </a:fontRef>
-          </p:style>
-          <p:txBody>
-            <a:bodyPr rtlCol="0" anchor="ctr"/>
-            <a:lstStyle/>
-            <a:p>
-              <a:pPr algn="ctr"/>
-              <a:r>
-                <a:rPr lang="en-US" sz="1800" dirty="0">
-                  <a:solidFill>
-                    <a:srgbClr val="000000"/>
-                  </a:solidFill>
-                </a:rPr>
-                <a:t>6</a:t>
-              </a:r>
-              <a:endParaRPr lang="en-US" sz="1800" dirty="0">
-                <a:solidFill>
-                  <a:srgbClr val="000000"/>
-                </a:solidFill>
-              </a:endParaRPr>
-            </a:p>
-          </p:txBody>
-        </p:sp>
       </p:grpSp>
-      <p:sp>
-        <p:nvSpPr>
-          <p:cNvPr id="27" name="Rectangle 26"/>
-          <p:cNvSpPr/>
-          <p:nvPr/>
-        </p:nvSpPr>
-        <p:spPr>
-          <a:xfrm>
-            <a:off x="6795610" y="4201105"/>
-            <a:ext cx="2791079" cy="1361393"/>
-          </a:xfrm>
-          <a:prstGeom prst="rect">
-            <a:avLst/>
-          </a:prstGeom>
-          <a:noFill/>
-          <a:ln w="25400">
-            <a:solidFill>
-              <a:schemeClr val="tx1"/>
-            </a:solidFill>
-          </a:ln>
-          <a:effectLst/>
-        </p:spPr>
-        <p:style>
-          <a:lnRef idx="1">
-            <a:schemeClr val="accent1"/>
-          </a:lnRef>
-          <a:fillRef idx="3">
-            <a:schemeClr val="accent1"/>
-          </a:fillRef>
-          <a:effectRef idx="2">
-            <a:schemeClr val="accent1"/>
-          </a:effectRef>
-          <a:fontRef idx="minor">
-            <a:schemeClr val="lt1"/>
-          </a:fontRef>
-        </p:style>
-        <p:txBody>
-          <a:bodyPr lIns="137840" tIns="68918" rIns="137840" bIns="68918" rtlCol="0" anchor="ctr"/>
-          <a:lstStyle/>
-          <a:p>
-            <a:pPr algn="ctr"/>
-            <a:r>
-              <a:rPr lang="en-US" dirty="0" smtClean="0">
-                <a:solidFill>
-                  <a:schemeClr val="tx1"/>
-                </a:solidFill>
-              </a:rPr>
-              <a:t>Backend-Server</a:t>
-            </a:r>
-            <a:endParaRPr lang="en-US" dirty="0">
-              <a:solidFill>
-                <a:schemeClr val="tx1"/>
-              </a:solidFill>
-            </a:endParaRPr>
-          </a:p>
-        </p:txBody>
-      </p:sp>
-      <p:cxnSp>
-        <p:nvCxnSpPr>
-          <p:cNvPr id="28" name="Straight Arrow Connector 27"/>
-          <p:cNvCxnSpPr/>
-          <p:nvPr/>
-        </p:nvCxnSpPr>
-        <p:spPr>
-          <a:xfrm>
-            <a:off x="5549035" y="4660596"/>
-            <a:ext cx="1246581" cy="0"/>
-          </a:xfrm>
-          <a:prstGeom prst="straightConnector1">
-            <a:avLst/>
-          </a:prstGeom>
-          <a:ln>
-            <a:solidFill>
-              <a:schemeClr val="tx1"/>
-            </a:solidFill>
-            <a:tailEnd type="arrow"/>
-          </a:ln>
-          <a:effectLst/>
-        </p:spPr>
-        <p:style>
-          <a:lnRef idx="2">
-            <a:schemeClr val="accent1"/>
-          </a:lnRef>
-          <a:fillRef idx="0">
-            <a:schemeClr val="accent1"/>
-          </a:fillRef>
-          <a:effectRef idx="1">
-            <a:schemeClr val="accent1"/>
-          </a:effectRef>
-          <a:fontRef idx="minor">
-            <a:schemeClr val="tx1"/>
-          </a:fontRef>
-        </p:style>
-      </p:cxnSp>
-      <p:cxnSp>
-        <p:nvCxnSpPr>
-          <p:cNvPr id="31" name="Straight Arrow Connector 30"/>
-          <p:cNvCxnSpPr/>
-          <p:nvPr/>
-        </p:nvCxnSpPr>
-        <p:spPr>
-          <a:xfrm flipH="1">
-            <a:off x="5549029" y="5194473"/>
-            <a:ext cx="1246582" cy="0"/>
-          </a:xfrm>
-          <a:prstGeom prst="straightConnector1">
-            <a:avLst/>
-          </a:prstGeom>
-          <a:ln>
-            <a:solidFill>
-              <a:schemeClr val="tx1"/>
-            </a:solidFill>
-            <a:tailEnd type="arrow"/>
-          </a:ln>
-          <a:effectLst/>
-        </p:spPr>
-        <p:style>
-          <a:lnRef idx="2">
-            <a:schemeClr val="accent1"/>
-          </a:lnRef>
-          <a:fillRef idx="0">
-            <a:schemeClr val="accent1"/>
-          </a:fillRef>
-          <a:effectRef idx="1">
-            <a:schemeClr val="accent1"/>
-          </a:effectRef>
-          <a:fontRef idx="minor">
-            <a:schemeClr val="tx1"/>
-          </a:fontRef>
-        </p:style>
-      </p:cxnSp>
-      <p:sp>
-        <p:nvSpPr>
-          <p:cNvPr id="18" name="Oval 17"/>
-          <p:cNvSpPr/>
-          <p:nvPr/>
-        </p:nvSpPr>
-        <p:spPr>
-          <a:xfrm>
-            <a:off x="5738483" y="3939392"/>
-            <a:ext cx="1043550" cy="555364"/>
-          </a:xfrm>
-          <a:prstGeom prst="ellipse">
-            <a:avLst/>
-          </a:prstGeom>
-          <a:noFill/>
-          <a:ln w="12700">
-            <a:solidFill>
-              <a:schemeClr val="tx1"/>
-            </a:solidFill>
-          </a:ln>
-          <a:effectLst/>
-        </p:spPr>
-        <p:style>
-          <a:lnRef idx="1">
-            <a:schemeClr val="accent1"/>
-          </a:lnRef>
-          <a:fillRef idx="3">
-            <a:schemeClr val="accent1"/>
-          </a:fillRef>
-          <a:effectRef idx="2">
-            <a:schemeClr val="accent1"/>
-          </a:effectRef>
-          <a:fontRef idx="minor">
-            <a:schemeClr val="lt1"/>
-          </a:fontRef>
-        </p:style>
-        <p:txBody>
-          <a:bodyPr lIns="137840" tIns="68918" rIns="137840" bIns="68918" rtlCol="0" anchor="ctr"/>
-          <a:lstStyle/>
-          <a:p>
-            <a:pPr algn="ctr"/>
-            <a:r>
-              <a:rPr lang="en-US" sz="1800" dirty="0">
-                <a:solidFill>
-                  <a:srgbClr val="000000"/>
-                </a:solidFill>
-              </a:rPr>
-              <a:t>3</a:t>
-            </a:r>
-          </a:p>
-        </p:txBody>
-      </p:sp>
-      <p:sp>
-        <p:nvSpPr>
-          <p:cNvPr id="22" name="Oval 21"/>
-          <p:cNvSpPr/>
-          <p:nvPr/>
-        </p:nvSpPr>
-        <p:spPr>
-          <a:xfrm>
-            <a:off x="5738483" y="5284815"/>
-            <a:ext cx="1043550" cy="555364"/>
-          </a:xfrm>
-          <a:prstGeom prst="ellipse">
-            <a:avLst/>
-          </a:prstGeom>
-          <a:noFill/>
-          <a:ln w="12700">
-            <a:solidFill>
-              <a:schemeClr val="tx1"/>
-            </a:solidFill>
-          </a:ln>
-          <a:effectLst/>
-        </p:spPr>
-        <p:style>
-          <a:lnRef idx="1">
-            <a:schemeClr val="accent1"/>
-          </a:lnRef>
-          <a:fillRef idx="3">
-            <a:schemeClr val="accent1"/>
-          </a:fillRef>
-          <a:effectRef idx="2">
-            <a:schemeClr val="accent1"/>
-          </a:effectRef>
-          <a:fontRef idx="minor">
-            <a:schemeClr val="lt1"/>
-          </a:fontRef>
-        </p:style>
-        <p:txBody>
-          <a:bodyPr lIns="137840" tIns="68918" rIns="137840" bIns="68918" rtlCol="0" anchor="ctr"/>
-          <a:lstStyle/>
-          <a:p>
-            <a:pPr algn="ctr"/>
-            <a:r>
-              <a:rPr lang="en-US" sz="1800" dirty="0">
-                <a:solidFill>
-                  <a:srgbClr val="000000"/>
-                </a:solidFill>
-              </a:rPr>
-              <a:t>4</a:t>
-            </a:r>
-            <a:endParaRPr lang="en-US" sz="1800" dirty="0">
-              <a:solidFill>
-                <a:srgbClr val="000000"/>
-              </a:solidFill>
-            </a:endParaRPr>
-          </a:p>
-        </p:txBody>
-      </p:sp>
     </p:spTree>
     <p:extLst>
       <p:ext uri="{BB962C8B-B14F-4D97-AF65-F5344CB8AC3E}">
@@ -17386,11 +17268,6 @@
               </a:rPr>
               <a:t>Proxy Aggregator</a:t>
             </a:r>
-            <a:endParaRPr lang="en-US" sz="3000" dirty="0">
-              <a:solidFill>
-                <a:schemeClr val="tx1"/>
-              </a:solidFill>
-            </a:endParaRPr>
           </a:p>
         </p:txBody>
       </p:sp>
@@ -17993,11 +17870,6 @@
               </a:rPr>
               <a:t>Proxy Aggregator</a:t>
             </a:r>
-            <a:endParaRPr lang="en-US" sz="3000" dirty="0">
-              <a:solidFill>
-                <a:schemeClr val="tx1"/>
-              </a:solidFill>
-            </a:endParaRPr>
           </a:p>
         </p:txBody>
       </p:sp>

</xml_diff>